<commit_message>
oppdatert versjon av powerpoint
</commit_message>
<xml_diff>
--- a/presentation/presbiosim.pptx
+++ b/presentation/presbiosim.pptx
@@ -8,6 +8,7 @@
     <p:sldId id="256" r:id="rId2"/>
     <p:sldId id="258" r:id="rId3"/>
     <p:sldId id="257" r:id="rId4"/>
+    <p:sldId id="259" r:id="rId5"/>
   </p:sldIdLst>
   <p:sldSz cx="12192000" cy="6858000"/>
   <p:notesSz cx="6858000" cy="9144000"/>
@@ -106,7 +107,16 @@
       </a:defRPr>
     </a:lvl9pPr>
   </p:defaultTextStyle>
+  <p:extLst>
+    <p:ext uri="{EFAFB233-063F-42B5-8137-9DF3F51BA10A}">
+      <p15:sldGuideLst xmlns:p15="http://schemas.microsoft.com/office/powerpoint/2012/main"/>
+    </p:ext>
+  </p:extLst>
 </p:presentation>
+</file>
+
+<file path=ppt/revisionInfo.xml><?xml version="1.0" encoding="utf-8"?>
+<p1510:revInfo xmlns:a="http://schemas.openxmlformats.org/drawingml/2006/main" xmlns:r="http://schemas.openxmlformats.org/officeDocument/2006/relationships" xmlns:p1510="http://schemas.microsoft.com/office/powerpoint/2015/10/main"/>
 </file>
 
 <file path=ppt/slideLayouts/slideLayout1.xml><?xml version="1.0" encoding="utf-8"?>
@@ -5946,14 +5956,52 @@
         </p:blipFill>
         <p:spPr>
           <a:xfrm>
-            <a:off x="142875" y="539461"/>
-            <a:ext cx="12192000" cy="2216727"/>
+            <a:off x="7817" y="1"/>
+            <a:ext cx="12184183" cy="2698811"/>
           </a:xfrm>
           <a:prstGeom prst="rect">
             <a:avLst/>
           </a:prstGeom>
         </p:spPr>
       </p:pic>
+      <p:sp>
+        <p:nvSpPr>
+          <p:cNvPr id="4" name="TekstSylinder 3">
+            <a:extLst>
+              <a:ext uri="{FF2B5EF4-FFF2-40B4-BE49-F238E27FC236}">
+                <a16:creationId xmlns:a16="http://schemas.microsoft.com/office/drawing/2014/main" id="{D89870AF-7246-418B-89F5-57A8556BF7D9}"/>
+              </a:ext>
+            </a:extLst>
+          </p:cNvPr>
+          <p:cNvSpPr txBox="1"/>
+          <p:nvPr/>
+        </p:nvSpPr>
+        <p:spPr>
+          <a:xfrm>
+            <a:off x="301841" y="3497802"/>
+            <a:ext cx="9161755" cy="646331"/>
+          </a:xfrm>
+          <a:prstGeom prst="rect">
+            <a:avLst/>
+          </a:prstGeom>
+          <a:noFill/>
+        </p:spPr>
+        <p:txBody>
+          <a:bodyPr wrap="square" rtlCol="0">
+            <a:spAutoFit/>
+          </a:bodyPr>
+          <a:lstStyle/>
+          <a:p>
+            <a:r>
+              <a:rPr lang="nb-NO" dirty="0"/>
+              <a:t>Tid:</a:t>
+            </a:r>
+          </a:p>
+          <a:p>
+            <a:endParaRPr lang="nb-NO" dirty="0"/>
+          </a:p>
+        </p:txBody>
+      </p:sp>
     </p:spTree>
     <p:extLst>
       <p:ext uri="{BB962C8B-B14F-4D97-AF65-F5344CB8AC3E}">
@@ -6014,10 +6062,1055 @@
           </a:prstGeom>
         </p:spPr>
       </p:pic>
+      <p:sp>
+        <p:nvSpPr>
+          <p:cNvPr id="4" name="TekstSylinder 3">
+            <a:extLst>
+              <a:ext uri="{FF2B5EF4-FFF2-40B4-BE49-F238E27FC236}">
+                <a16:creationId xmlns:a16="http://schemas.microsoft.com/office/drawing/2014/main" id="{CB0EF17D-EFBD-4C47-95C6-157C90B75F9F}"/>
+              </a:ext>
+            </a:extLst>
+          </p:cNvPr>
+          <p:cNvSpPr txBox="1"/>
+          <p:nvPr/>
+        </p:nvSpPr>
+        <p:spPr>
+          <a:xfrm>
+            <a:off x="408373" y="3710866"/>
+            <a:ext cx="8984202" cy="646331"/>
+          </a:xfrm>
+          <a:prstGeom prst="rect">
+            <a:avLst/>
+          </a:prstGeom>
+          <a:noFill/>
+        </p:spPr>
+        <p:txBody>
+          <a:bodyPr wrap="square" rtlCol="0">
+            <a:spAutoFit/>
+          </a:bodyPr>
+          <a:lstStyle/>
+          <a:p>
+            <a:r>
+              <a:rPr lang="nb-NO" dirty="0"/>
+              <a:t>Egentid:</a:t>
+            </a:r>
+          </a:p>
+          <a:p>
+            <a:endParaRPr lang="nb-NO" dirty="0"/>
+          </a:p>
+        </p:txBody>
+      </p:sp>
     </p:spTree>
     <p:extLst>
       <p:ext uri="{BB962C8B-B14F-4D97-AF65-F5344CB8AC3E}">
         <p14:creationId xmlns:p14="http://schemas.microsoft.com/office/powerpoint/2010/main" val="3863764552"/>
+      </p:ext>
+    </p:extLst>
+  </p:cSld>
+  <p:clrMapOvr>
+    <a:masterClrMapping/>
+  </p:clrMapOvr>
+</p:sld>
+</file>
+
+<file path=ppt/slides/slide4.xml><?xml version="1.0" encoding="utf-8"?>
+<p:sld xmlns:a="http://schemas.openxmlformats.org/drawingml/2006/main" xmlns:r="http://schemas.openxmlformats.org/officeDocument/2006/relationships" xmlns:p="http://schemas.openxmlformats.org/presentationml/2006/main">
+  <p:cSld>
+    <p:spTree>
+      <p:nvGrpSpPr>
+        <p:cNvPr id="1" name=""/>
+        <p:cNvGrpSpPr/>
+        <p:nvPr/>
+      </p:nvGrpSpPr>
+      <p:grpSpPr>
+        <a:xfrm>
+          <a:off x="0" y="0"/>
+          <a:ext cx="0" cy="0"/>
+          <a:chOff x="0" y="0"/>
+          <a:chExt cx="0" cy="0"/>
+        </a:xfrm>
+      </p:grpSpPr>
+      <p:sp>
+        <p:nvSpPr>
+          <p:cNvPr id="2" name="TekstSylinder 1">
+            <a:extLst>
+              <a:ext uri="{FF2B5EF4-FFF2-40B4-BE49-F238E27FC236}">
+                <a16:creationId xmlns:a16="http://schemas.microsoft.com/office/drawing/2014/main" id="{D6E4240E-CE1D-4E1D-A80F-8BB86C94CE72}"/>
+              </a:ext>
+            </a:extLst>
+          </p:cNvPr>
+          <p:cNvSpPr txBox="1"/>
+          <p:nvPr/>
+        </p:nvSpPr>
+        <p:spPr>
+          <a:xfrm>
+            <a:off x="4083728" y="266330"/>
+            <a:ext cx="2308194" cy="369332"/>
+          </a:xfrm>
+          <a:prstGeom prst="rect">
+            <a:avLst/>
+          </a:prstGeom>
+          <a:noFill/>
+        </p:spPr>
+        <p:txBody>
+          <a:bodyPr wrap="square" rtlCol="0">
+            <a:spAutoFit/>
+          </a:bodyPr>
+          <a:lstStyle/>
+          <a:p>
+            <a:pPr algn="ctr"/>
+            <a:r>
+              <a:rPr lang="nb-NO" dirty="0" err="1"/>
+              <a:t>BioSim</a:t>
+            </a:r>
+            <a:endParaRPr lang="nb-NO" dirty="0"/>
+          </a:p>
+        </p:txBody>
+      </p:sp>
+      <p:sp>
+        <p:nvSpPr>
+          <p:cNvPr id="3" name="TekstSylinder 2">
+            <a:extLst>
+              <a:ext uri="{FF2B5EF4-FFF2-40B4-BE49-F238E27FC236}">
+                <a16:creationId xmlns:a16="http://schemas.microsoft.com/office/drawing/2014/main" id="{8CFC9723-D149-4897-9D86-841E13928976}"/>
+              </a:ext>
+            </a:extLst>
+          </p:cNvPr>
+          <p:cNvSpPr txBox="1"/>
+          <p:nvPr/>
+        </p:nvSpPr>
+        <p:spPr>
+          <a:xfrm>
+            <a:off x="1606858" y="1145219"/>
+            <a:ext cx="1953088" cy="369332"/>
+          </a:xfrm>
+          <a:prstGeom prst="rect">
+            <a:avLst/>
+          </a:prstGeom>
+          <a:noFill/>
+        </p:spPr>
+        <p:txBody>
+          <a:bodyPr wrap="square" rtlCol="0">
+            <a:spAutoFit/>
+          </a:bodyPr>
+          <a:lstStyle/>
+          <a:p>
+            <a:pPr algn="ctr"/>
+            <a:r>
+              <a:rPr lang="nb-NO" dirty="0"/>
+              <a:t>Island</a:t>
+            </a:r>
+          </a:p>
+        </p:txBody>
+      </p:sp>
+      <p:sp>
+        <p:nvSpPr>
+          <p:cNvPr id="4" name="TekstSylinder 3">
+            <a:extLst>
+              <a:ext uri="{FF2B5EF4-FFF2-40B4-BE49-F238E27FC236}">
+                <a16:creationId xmlns:a16="http://schemas.microsoft.com/office/drawing/2014/main" id="{03D37941-03BB-4D2A-A6D2-9E20681D4A28}"/>
+              </a:ext>
+            </a:extLst>
+          </p:cNvPr>
+          <p:cNvSpPr txBox="1"/>
+          <p:nvPr/>
+        </p:nvSpPr>
+        <p:spPr>
+          <a:xfrm>
+            <a:off x="6684883" y="1145219"/>
+            <a:ext cx="1935332" cy="369332"/>
+          </a:xfrm>
+          <a:prstGeom prst="rect">
+            <a:avLst/>
+          </a:prstGeom>
+          <a:noFill/>
+        </p:spPr>
+        <p:txBody>
+          <a:bodyPr wrap="square" rtlCol="0">
+            <a:spAutoFit/>
+          </a:bodyPr>
+          <a:lstStyle/>
+          <a:p>
+            <a:pPr algn="ctr"/>
+            <a:r>
+              <a:rPr lang="nb-NO" dirty="0"/>
+              <a:t>Simulering</a:t>
+            </a:r>
+          </a:p>
+        </p:txBody>
+      </p:sp>
+      <p:sp>
+        <p:nvSpPr>
+          <p:cNvPr id="5" name="TekstSylinder 4">
+            <a:extLst>
+              <a:ext uri="{FF2B5EF4-FFF2-40B4-BE49-F238E27FC236}">
+                <a16:creationId xmlns:a16="http://schemas.microsoft.com/office/drawing/2014/main" id="{69DC1C5E-F647-453E-B635-C4D625CFB549}"/>
+              </a:ext>
+            </a:extLst>
+          </p:cNvPr>
+          <p:cNvSpPr txBox="1"/>
+          <p:nvPr/>
+        </p:nvSpPr>
+        <p:spPr>
+          <a:xfrm>
+            <a:off x="1651246" y="2263806"/>
+            <a:ext cx="1864311" cy="369332"/>
+          </a:xfrm>
+          <a:prstGeom prst="rect">
+            <a:avLst/>
+          </a:prstGeom>
+          <a:noFill/>
+        </p:spPr>
+        <p:txBody>
+          <a:bodyPr wrap="square" rtlCol="0">
+            <a:spAutoFit/>
+          </a:bodyPr>
+          <a:lstStyle/>
+          <a:p>
+            <a:pPr algn="ctr"/>
+            <a:r>
+              <a:rPr lang="nb-NO" dirty="0"/>
+              <a:t>Landscapes</a:t>
+            </a:r>
+          </a:p>
+        </p:txBody>
+      </p:sp>
+      <p:sp>
+        <p:nvSpPr>
+          <p:cNvPr id="7" name="TekstSylinder 6">
+            <a:extLst>
+              <a:ext uri="{FF2B5EF4-FFF2-40B4-BE49-F238E27FC236}">
+                <a16:creationId xmlns:a16="http://schemas.microsoft.com/office/drawing/2014/main" id="{21253703-21E8-4AE1-8005-E773748993D5}"/>
+              </a:ext>
+            </a:extLst>
+          </p:cNvPr>
+          <p:cNvSpPr txBox="1"/>
+          <p:nvPr/>
+        </p:nvSpPr>
+        <p:spPr>
+          <a:xfrm>
+            <a:off x="1788849" y="4563123"/>
+            <a:ext cx="1589103" cy="381740"/>
+          </a:xfrm>
+          <a:prstGeom prst="rect">
+            <a:avLst/>
+          </a:prstGeom>
+          <a:noFill/>
+        </p:spPr>
+        <p:txBody>
+          <a:bodyPr wrap="square" rtlCol="0">
+            <a:spAutoFit/>
+          </a:bodyPr>
+          <a:lstStyle/>
+          <a:p>
+            <a:pPr algn="ctr"/>
+            <a:r>
+              <a:rPr lang="nb-NO" dirty="0" err="1"/>
+              <a:t>Animals</a:t>
+            </a:r>
+            <a:endParaRPr lang="nb-NO" dirty="0"/>
+          </a:p>
+        </p:txBody>
+      </p:sp>
+      <p:sp>
+        <p:nvSpPr>
+          <p:cNvPr id="10" name="TekstSylinder 9">
+            <a:extLst>
+              <a:ext uri="{FF2B5EF4-FFF2-40B4-BE49-F238E27FC236}">
+                <a16:creationId xmlns:a16="http://schemas.microsoft.com/office/drawing/2014/main" id="{D68A99DC-E29F-4361-A516-695C15AD645B}"/>
+              </a:ext>
+            </a:extLst>
+          </p:cNvPr>
+          <p:cNvSpPr txBox="1"/>
+          <p:nvPr/>
+        </p:nvSpPr>
+        <p:spPr>
+          <a:xfrm>
+            <a:off x="4591973" y="2621587"/>
+            <a:ext cx="1615735" cy="381739"/>
+          </a:xfrm>
+          <a:prstGeom prst="rect">
+            <a:avLst/>
+          </a:prstGeom>
+          <a:noFill/>
+        </p:spPr>
+        <p:txBody>
+          <a:bodyPr wrap="square" rtlCol="0">
+            <a:spAutoFit/>
+          </a:bodyPr>
+          <a:lstStyle/>
+          <a:p>
+            <a:pPr algn="ctr"/>
+            <a:r>
+              <a:rPr lang="nb-NO" dirty="0" err="1"/>
+              <a:t>Jungle</a:t>
+            </a:r>
+            <a:endParaRPr lang="nb-NO" dirty="0"/>
+          </a:p>
+        </p:txBody>
+      </p:sp>
+      <p:sp>
+        <p:nvSpPr>
+          <p:cNvPr id="11" name="TekstSylinder 10">
+            <a:extLst>
+              <a:ext uri="{FF2B5EF4-FFF2-40B4-BE49-F238E27FC236}">
+                <a16:creationId xmlns:a16="http://schemas.microsoft.com/office/drawing/2014/main" id="{C77D06B7-7FE1-4A6C-85E2-5F8D56BAB253}"/>
+              </a:ext>
+            </a:extLst>
+          </p:cNvPr>
+          <p:cNvSpPr txBox="1"/>
+          <p:nvPr/>
+        </p:nvSpPr>
+        <p:spPr>
+          <a:xfrm>
+            <a:off x="4244637" y="3393493"/>
+            <a:ext cx="1233996" cy="369332"/>
+          </a:xfrm>
+          <a:prstGeom prst="rect">
+            <a:avLst/>
+          </a:prstGeom>
+          <a:noFill/>
+        </p:spPr>
+        <p:txBody>
+          <a:bodyPr wrap="square" rtlCol="0">
+            <a:spAutoFit/>
+          </a:bodyPr>
+          <a:lstStyle/>
+          <a:p>
+            <a:r>
+              <a:rPr lang="nb-NO" dirty="0"/>
+              <a:t>Savannah</a:t>
+            </a:r>
+          </a:p>
+        </p:txBody>
+      </p:sp>
+      <p:sp>
+        <p:nvSpPr>
+          <p:cNvPr id="12" name="TekstSylinder 11">
+            <a:extLst>
+              <a:ext uri="{FF2B5EF4-FFF2-40B4-BE49-F238E27FC236}">
+                <a16:creationId xmlns:a16="http://schemas.microsoft.com/office/drawing/2014/main" id="{18F47B8A-844C-463A-815D-8A91AEF26FDC}"/>
+              </a:ext>
+            </a:extLst>
+          </p:cNvPr>
+          <p:cNvSpPr txBox="1"/>
+          <p:nvPr/>
+        </p:nvSpPr>
+        <p:spPr>
+          <a:xfrm>
+            <a:off x="5566300" y="3386029"/>
+            <a:ext cx="1083075" cy="369332"/>
+          </a:xfrm>
+          <a:prstGeom prst="rect">
+            <a:avLst/>
+          </a:prstGeom>
+          <a:noFill/>
+        </p:spPr>
+        <p:txBody>
+          <a:bodyPr wrap="square" rtlCol="0">
+            <a:spAutoFit/>
+          </a:bodyPr>
+          <a:lstStyle/>
+          <a:p>
+            <a:pPr algn="ctr"/>
+            <a:r>
+              <a:rPr lang="nb-NO" dirty="0" err="1"/>
+              <a:t>Desert</a:t>
+            </a:r>
+            <a:endParaRPr lang="nb-NO" dirty="0"/>
+          </a:p>
+        </p:txBody>
+      </p:sp>
+      <p:sp>
+        <p:nvSpPr>
+          <p:cNvPr id="13" name="TekstSylinder 12">
+            <a:extLst>
+              <a:ext uri="{FF2B5EF4-FFF2-40B4-BE49-F238E27FC236}">
+                <a16:creationId xmlns:a16="http://schemas.microsoft.com/office/drawing/2014/main" id="{0FF243F6-F2C9-4AE8-9872-09B6E3F6F88F}"/>
+              </a:ext>
+            </a:extLst>
+          </p:cNvPr>
+          <p:cNvSpPr txBox="1"/>
+          <p:nvPr/>
+        </p:nvSpPr>
+        <p:spPr>
+          <a:xfrm>
+            <a:off x="2805343" y="3012204"/>
+            <a:ext cx="1420427" cy="369332"/>
+          </a:xfrm>
+          <a:prstGeom prst="rect">
+            <a:avLst/>
+          </a:prstGeom>
+          <a:noFill/>
+        </p:spPr>
+        <p:txBody>
+          <a:bodyPr wrap="square" rtlCol="0">
+            <a:spAutoFit/>
+          </a:bodyPr>
+          <a:lstStyle/>
+          <a:p>
+            <a:pPr algn="ctr"/>
+            <a:r>
+              <a:rPr lang="nb-NO" dirty="0" err="1"/>
+              <a:t>Mountain</a:t>
+            </a:r>
+            <a:endParaRPr lang="nb-NO" dirty="0"/>
+          </a:p>
+        </p:txBody>
+      </p:sp>
+      <p:sp>
+        <p:nvSpPr>
+          <p:cNvPr id="14" name="TekstSylinder 13">
+            <a:extLst>
+              <a:ext uri="{FF2B5EF4-FFF2-40B4-BE49-F238E27FC236}">
+                <a16:creationId xmlns:a16="http://schemas.microsoft.com/office/drawing/2014/main" id="{F61EF8E1-C83D-423B-BF35-0644375ECF1B}"/>
+              </a:ext>
+            </a:extLst>
+          </p:cNvPr>
+          <p:cNvSpPr txBox="1"/>
+          <p:nvPr/>
+        </p:nvSpPr>
+        <p:spPr>
+          <a:xfrm>
+            <a:off x="1282821" y="3026428"/>
+            <a:ext cx="1189607" cy="369332"/>
+          </a:xfrm>
+          <a:prstGeom prst="rect">
+            <a:avLst/>
+          </a:prstGeom>
+          <a:noFill/>
+        </p:spPr>
+        <p:txBody>
+          <a:bodyPr wrap="square" rtlCol="0">
+            <a:spAutoFit/>
+          </a:bodyPr>
+          <a:lstStyle/>
+          <a:p>
+            <a:r>
+              <a:rPr lang="nb-NO" dirty="0"/>
+              <a:t>Ocean</a:t>
+            </a:r>
+          </a:p>
+        </p:txBody>
+      </p:sp>
+      <p:sp>
+        <p:nvSpPr>
+          <p:cNvPr id="15" name="TekstSylinder 14">
+            <a:extLst>
+              <a:ext uri="{FF2B5EF4-FFF2-40B4-BE49-F238E27FC236}">
+                <a16:creationId xmlns:a16="http://schemas.microsoft.com/office/drawing/2014/main" id="{0CF3EBBF-593D-444D-80D9-0A6D8E15FE14}"/>
+              </a:ext>
+            </a:extLst>
+          </p:cNvPr>
+          <p:cNvSpPr txBox="1"/>
+          <p:nvPr/>
+        </p:nvSpPr>
+        <p:spPr>
+          <a:xfrm>
+            <a:off x="4636361" y="5059470"/>
+            <a:ext cx="1571347" cy="369332"/>
+          </a:xfrm>
+          <a:prstGeom prst="rect">
+            <a:avLst/>
+          </a:prstGeom>
+          <a:noFill/>
+        </p:spPr>
+        <p:txBody>
+          <a:bodyPr wrap="square" rtlCol="0">
+            <a:spAutoFit/>
+          </a:bodyPr>
+          <a:lstStyle/>
+          <a:p>
+            <a:pPr algn="ctr"/>
+            <a:r>
+              <a:rPr lang="nb-NO" dirty="0"/>
+              <a:t>Herbivores</a:t>
+            </a:r>
+          </a:p>
+        </p:txBody>
+      </p:sp>
+      <p:sp>
+        <p:nvSpPr>
+          <p:cNvPr id="16" name="TekstSylinder 15">
+            <a:extLst>
+              <a:ext uri="{FF2B5EF4-FFF2-40B4-BE49-F238E27FC236}">
+                <a16:creationId xmlns:a16="http://schemas.microsoft.com/office/drawing/2014/main" id="{7A7CEC24-D009-4935-BD9D-CC6D92882EF7}"/>
+              </a:ext>
+            </a:extLst>
+          </p:cNvPr>
+          <p:cNvSpPr txBox="1"/>
+          <p:nvPr/>
+        </p:nvSpPr>
+        <p:spPr>
+          <a:xfrm>
+            <a:off x="4543144" y="5978364"/>
+            <a:ext cx="1757779" cy="369332"/>
+          </a:xfrm>
+          <a:prstGeom prst="rect">
+            <a:avLst/>
+          </a:prstGeom>
+          <a:noFill/>
+        </p:spPr>
+        <p:txBody>
+          <a:bodyPr wrap="square" rtlCol="0">
+            <a:spAutoFit/>
+          </a:bodyPr>
+          <a:lstStyle/>
+          <a:p>
+            <a:pPr algn="ctr"/>
+            <a:r>
+              <a:rPr lang="nb-NO" dirty="0" err="1"/>
+              <a:t>Carnivores</a:t>
+            </a:r>
+            <a:endParaRPr lang="nb-NO" dirty="0"/>
+          </a:p>
+        </p:txBody>
+      </p:sp>
+      <p:cxnSp>
+        <p:nvCxnSpPr>
+          <p:cNvPr id="18" name="Rett pilkobling 17">
+            <a:extLst>
+              <a:ext uri="{FF2B5EF4-FFF2-40B4-BE49-F238E27FC236}">
+                <a16:creationId xmlns:a16="http://schemas.microsoft.com/office/drawing/2014/main" id="{31898799-E63F-49C4-A366-2C864DA8A1F0}"/>
+              </a:ext>
+            </a:extLst>
+          </p:cNvPr>
+          <p:cNvCxnSpPr>
+            <a:stCxn id="2" idx="2"/>
+            <a:endCxn id="3" idx="0"/>
+          </p:cNvCxnSpPr>
+          <p:nvPr/>
+        </p:nvCxnSpPr>
+        <p:spPr>
+          <a:xfrm flipH="1">
+            <a:off x="2583402" y="635662"/>
+            <a:ext cx="2654423" cy="509557"/>
+          </a:xfrm>
+          <a:prstGeom prst="straightConnector1">
+            <a:avLst/>
+          </a:prstGeom>
+          <a:ln>
+            <a:tailEnd type="triangle"/>
+          </a:ln>
+        </p:spPr>
+        <p:style>
+          <a:lnRef idx="1">
+            <a:schemeClr val="accent1"/>
+          </a:lnRef>
+          <a:fillRef idx="0">
+            <a:schemeClr val="accent1"/>
+          </a:fillRef>
+          <a:effectRef idx="0">
+            <a:schemeClr val="accent1"/>
+          </a:effectRef>
+          <a:fontRef idx="minor">
+            <a:schemeClr val="tx1"/>
+          </a:fontRef>
+        </p:style>
+      </p:cxnSp>
+      <p:cxnSp>
+        <p:nvCxnSpPr>
+          <p:cNvPr id="20" name="Rett pilkobling 19">
+            <a:extLst>
+              <a:ext uri="{FF2B5EF4-FFF2-40B4-BE49-F238E27FC236}">
+                <a16:creationId xmlns:a16="http://schemas.microsoft.com/office/drawing/2014/main" id="{82D0E1F6-1040-4CDD-9482-D935ED7B389F}"/>
+              </a:ext>
+            </a:extLst>
+          </p:cNvPr>
+          <p:cNvCxnSpPr>
+            <a:stCxn id="2" idx="2"/>
+            <a:endCxn id="4" idx="0"/>
+          </p:cNvCxnSpPr>
+          <p:nvPr/>
+        </p:nvCxnSpPr>
+        <p:spPr>
+          <a:xfrm>
+            <a:off x="5237825" y="635662"/>
+            <a:ext cx="2414724" cy="509557"/>
+          </a:xfrm>
+          <a:prstGeom prst="straightConnector1">
+            <a:avLst/>
+          </a:prstGeom>
+          <a:ln>
+            <a:tailEnd type="triangle"/>
+          </a:ln>
+        </p:spPr>
+        <p:style>
+          <a:lnRef idx="1">
+            <a:schemeClr val="accent1"/>
+          </a:lnRef>
+          <a:fillRef idx="0">
+            <a:schemeClr val="accent1"/>
+          </a:fillRef>
+          <a:effectRef idx="0">
+            <a:schemeClr val="accent1"/>
+          </a:effectRef>
+          <a:fontRef idx="minor">
+            <a:schemeClr val="tx1"/>
+          </a:fontRef>
+        </p:style>
+      </p:cxnSp>
+      <p:cxnSp>
+        <p:nvCxnSpPr>
+          <p:cNvPr id="22" name="Rett pilkobling 21">
+            <a:extLst>
+              <a:ext uri="{FF2B5EF4-FFF2-40B4-BE49-F238E27FC236}">
+                <a16:creationId xmlns:a16="http://schemas.microsoft.com/office/drawing/2014/main" id="{8F8C6D0B-A05B-427F-B960-B9FD4C0C81DC}"/>
+              </a:ext>
+            </a:extLst>
+          </p:cNvPr>
+          <p:cNvCxnSpPr>
+            <a:stCxn id="5" idx="3"/>
+            <a:endCxn id="10" idx="0"/>
+          </p:cNvCxnSpPr>
+          <p:nvPr/>
+        </p:nvCxnSpPr>
+        <p:spPr>
+          <a:xfrm>
+            <a:off x="3515557" y="2448472"/>
+            <a:ext cx="1884284" cy="173115"/>
+          </a:xfrm>
+          <a:prstGeom prst="straightConnector1">
+            <a:avLst/>
+          </a:prstGeom>
+          <a:ln>
+            <a:tailEnd type="triangle"/>
+          </a:ln>
+        </p:spPr>
+        <p:style>
+          <a:lnRef idx="1">
+            <a:schemeClr val="accent1"/>
+          </a:lnRef>
+          <a:fillRef idx="0">
+            <a:schemeClr val="accent1"/>
+          </a:fillRef>
+          <a:effectRef idx="0">
+            <a:schemeClr val="accent1"/>
+          </a:effectRef>
+          <a:fontRef idx="minor">
+            <a:schemeClr val="tx1"/>
+          </a:fontRef>
+        </p:style>
+      </p:cxnSp>
+      <p:cxnSp>
+        <p:nvCxnSpPr>
+          <p:cNvPr id="24" name="Rett pilkobling 23">
+            <a:extLst>
+              <a:ext uri="{FF2B5EF4-FFF2-40B4-BE49-F238E27FC236}">
+                <a16:creationId xmlns:a16="http://schemas.microsoft.com/office/drawing/2014/main" id="{CADF50D9-BA52-442C-837C-8668A1E0E6D5}"/>
+              </a:ext>
+            </a:extLst>
+          </p:cNvPr>
+          <p:cNvCxnSpPr>
+            <a:stCxn id="10" idx="2"/>
+            <a:endCxn id="11" idx="0"/>
+          </p:cNvCxnSpPr>
+          <p:nvPr/>
+        </p:nvCxnSpPr>
+        <p:spPr>
+          <a:xfrm flipH="1">
+            <a:off x="4861635" y="3003326"/>
+            <a:ext cx="538206" cy="390167"/>
+          </a:xfrm>
+          <a:prstGeom prst="straightConnector1">
+            <a:avLst/>
+          </a:prstGeom>
+          <a:ln>
+            <a:tailEnd type="triangle"/>
+          </a:ln>
+        </p:spPr>
+        <p:style>
+          <a:lnRef idx="1">
+            <a:schemeClr val="accent1"/>
+          </a:lnRef>
+          <a:fillRef idx="0">
+            <a:schemeClr val="accent1"/>
+          </a:fillRef>
+          <a:effectRef idx="0">
+            <a:schemeClr val="accent1"/>
+          </a:effectRef>
+          <a:fontRef idx="minor">
+            <a:schemeClr val="tx1"/>
+          </a:fontRef>
+        </p:style>
+      </p:cxnSp>
+      <p:cxnSp>
+        <p:nvCxnSpPr>
+          <p:cNvPr id="26" name="Rett pilkobling 25">
+            <a:extLst>
+              <a:ext uri="{FF2B5EF4-FFF2-40B4-BE49-F238E27FC236}">
+                <a16:creationId xmlns:a16="http://schemas.microsoft.com/office/drawing/2014/main" id="{5AFAD022-DAF1-432B-86D2-F75F06F3262E}"/>
+              </a:ext>
+            </a:extLst>
+          </p:cNvPr>
+          <p:cNvCxnSpPr>
+            <a:stCxn id="10" idx="2"/>
+            <a:endCxn id="12" idx="0"/>
+          </p:cNvCxnSpPr>
+          <p:nvPr/>
+        </p:nvCxnSpPr>
+        <p:spPr>
+          <a:xfrm>
+            <a:off x="5399841" y="3003326"/>
+            <a:ext cx="707997" cy="382703"/>
+          </a:xfrm>
+          <a:prstGeom prst="straightConnector1">
+            <a:avLst/>
+          </a:prstGeom>
+          <a:ln>
+            <a:tailEnd type="triangle"/>
+          </a:ln>
+        </p:spPr>
+        <p:style>
+          <a:lnRef idx="1">
+            <a:schemeClr val="accent1"/>
+          </a:lnRef>
+          <a:fillRef idx="0">
+            <a:schemeClr val="accent1"/>
+          </a:fillRef>
+          <a:effectRef idx="0">
+            <a:schemeClr val="accent1"/>
+          </a:effectRef>
+          <a:fontRef idx="minor">
+            <a:schemeClr val="tx1"/>
+          </a:fontRef>
+        </p:style>
+      </p:cxnSp>
+      <p:cxnSp>
+        <p:nvCxnSpPr>
+          <p:cNvPr id="28" name="Rett pilkobling 27">
+            <a:extLst>
+              <a:ext uri="{FF2B5EF4-FFF2-40B4-BE49-F238E27FC236}">
+                <a16:creationId xmlns:a16="http://schemas.microsoft.com/office/drawing/2014/main" id="{AE24E4CB-12A3-480B-82C5-A6ABD50460C9}"/>
+              </a:ext>
+            </a:extLst>
+          </p:cNvPr>
+          <p:cNvCxnSpPr>
+            <a:stCxn id="5" idx="2"/>
+            <a:endCxn id="14" idx="0"/>
+          </p:cNvCxnSpPr>
+          <p:nvPr/>
+        </p:nvCxnSpPr>
+        <p:spPr>
+          <a:xfrm flipH="1">
+            <a:off x="1877625" y="2633138"/>
+            <a:ext cx="705777" cy="393290"/>
+          </a:xfrm>
+          <a:prstGeom prst="straightConnector1">
+            <a:avLst/>
+          </a:prstGeom>
+          <a:ln>
+            <a:tailEnd type="triangle"/>
+          </a:ln>
+        </p:spPr>
+        <p:style>
+          <a:lnRef idx="1">
+            <a:schemeClr val="accent1"/>
+          </a:lnRef>
+          <a:fillRef idx="0">
+            <a:schemeClr val="accent1"/>
+          </a:fillRef>
+          <a:effectRef idx="0">
+            <a:schemeClr val="accent1"/>
+          </a:effectRef>
+          <a:fontRef idx="minor">
+            <a:schemeClr val="tx1"/>
+          </a:fontRef>
+        </p:style>
+      </p:cxnSp>
+      <p:cxnSp>
+        <p:nvCxnSpPr>
+          <p:cNvPr id="30" name="Rett pilkobling 29">
+            <a:extLst>
+              <a:ext uri="{FF2B5EF4-FFF2-40B4-BE49-F238E27FC236}">
+                <a16:creationId xmlns:a16="http://schemas.microsoft.com/office/drawing/2014/main" id="{D0E70AB2-B168-48F3-A2E7-6CEB31803BE8}"/>
+              </a:ext>
+            </a:extLst>
+          </p:cNvPr>
+          <p:cNvCxnSpPr>
+            <a:stCxn id="5" idx="2"/>
+            <a:endCxn id="13" idx="0"/>
+          </p:cNvCxnSpPr>
+          <p:nvPr/>
+        </p:nvCxnSpPr>
+        <p:spPr>
+          <a:xfrm>
+            <a:off x="2583402" y="2633138"/>
+            <a:ext cx="932155" cy="379066"/>
+          </a:xfrm>
+          <a:prstGeom prst="straightConnector1">
+            <a:avLst/>
+          </a:prstGeom>
+          <a:ln>
+            <a:tailEnd type="triangle"/>
+          </a:ln>
+        </p:spPr>
+        <p:style>
+          <a:lnRef idx="1">
+            <a:schemeClr val="accent1"/>
+          </a:lnRef>
+          <a:fillRef idx="0">
+            <a:schemeClr val="accent1"/>
+          </a:fillRef>
+          <a:effectRef idx="0">
+            <a:schemeClr val="accent1"/>
+          </a:effectRef>
+          <a:fontRef idx="minor">
+            <a:schemeClr val="tx1"/>
+          </a:fontRef>
+        </p:style>
+      </p:cxnSp>
+      <p:cxnSp>
+        <p:nvCxnSpPr>
+          <p:cNvPr id="33" name="Rett pilkobling 32">
+            <a:extLst>
+              <a:ext uri="{FF2B5EF4-FFF2-40B4-BE49-F238E27FC236}">
+                <a16:creationId xmlns:a16="http://schemas.microsoft.com/office/drawing/2014/main" id="{B3A8AF10-E6E3-45B6-A92B-F5B598A1B08B}"/>
+              </a:ext>
+            </a:extLst>
+          </p:cNvPr>
+          <p:cNvCxnSpPr>
+            <a:stCxn id="5" idx="2"/>
+            <a:endCxn id="7" idx="0"/>
+          </p:cNvCxnSpPr>
+          <p:nvPr/>
+        </p:nvCxnSpPr>
+        <p:spPr>
+          <a:xfrm flipH="1">
+            <a:off x="2583401" y="2633138"/>
+            <a:ext cx="1" cy="1929985"/>
+          </a:xfrm>
+          <a:prstGeom prst="straightConnector1">
+            <a:avLst/>
+          </a:prstGeom>
+          <a:ln>
+            <a:tailEnd type="triangle"/>
+          </a:ln>
+        </p:spPr>
+        <p:style>
+          <a:lnRef idx="1">
+            <a:schemeClr val="accent1"/>
+          </a:lnRef>
+          <a:fillRef idx="0">
+            <a:schemeClr val="accent1"/>
+          </a:fillRef>
+          <a:effectRef idx="0">
+            <a:schemeClr val="accent1"/>
+          </a:effectRef>
+          <a:fontRef idx="minor">
+            <a:schemeClr val="tx1"/>
+          </a:fontRef>
+        </p:style>
+      </p:cxnSp>
+      <p:cxnSp>
+        <p:nvCxnSpPr>
+          <p:cNvPr id="35" name="Rett pilkobling 34">
+            <a:extLst>
+              <a:ext uri="{FF2B5EF4-FFF2-40B4-BE49-F238E27FC236}">
+                <a16:creationId xmlns:a16="http://schemas.microsoft.com/office/drawing/2014/main" id="{5D1D9C24-21B1-4903-ACD9-E3AB7EA473A6}"/>
+              </a:ext>
+            </a:extLst>
+          </p:cNvPr>
+          <p:cNvCxnSpPr>
+            <a:cxnSpLocks/>
+            <a:stCxn id="7" idx="3"/>
+            <a:endCxn id="15" idx="0"/>
+          </p:cNvCxnSpPr>
+          <p:nvPr/>
+        </p:nvCxnSpPr>
+        <p:spPr>
+          <a:xfrm>
+            <a:off x="3377952" y="4753993"/>
+            <a:ext cx="2044083" cy="305477"/>
+          </a:xfrm>
+          <a:prstGeom prst="straightConnector1">
+            <a:avLst/>
+          </a:prstGeom>
+          <a:ln>
+            <a:tailEnd type="triangle"/>
+          </a:ln>
+        </p:spPr>
+        <p:style>
+          <a:lnRef idx="1">
+            <a:schemeClr val="accent1"/>
+          </a:lnRef>
+          <a:fillRef idx="0">
+            <a:schemeClr val="accent1"/>
+          </a:fillRef>
+          <a:effectRef idx="0">
+            <a:schemeClr val="accent1"/>
+          </a:effectRef>
+          <a:fontRef idx="minor">
+            <a:schemeClr val="tx1"/>
+          </a:fontRef>
+        </p:style>
+      </p:cxnSp>
+      <p:cxnSp>
+        <p:nvCxnSpPr>
+          <p:cNvPr id="37" name="Rett pilkobling 36">
+            <a:extLst>
+              <a:ext uri="{FF2B5EF4-FFF2-40B4-BE49-F238E27FC236}">
+                <a16:creationId xmlns:a16="http://schemas.microsoft.com/office/drawing/2014/main" id="{7899A379-2969-44B5-A5D6-C714820E6392}"/>
+              </a:ext>
+            </a:extLst>
+          </p:cNvPr>
+          <p:cNvCxnSpPr>
+            <a:stCxn id="15" idx="2"/>
+            <a:endCxn id="16" idx="0"/>
+          </p:cNvCxnSpPr>
+          <p:nvPr/>
+        </p:nvCxnSpPr>
+        <p:spPr>
+          <a:xfrm flipH="1">
+            <a:off x="5422034" y="5428802"/>
+            <a:ext cx="1" cy="549562"/>
+          </a:xfrm>
+          <a:prstGeom prst="straightConnector1">
+            <a:avLst/>
+          </a:prstGeom>
+          <a:ln>
+            <a:tailEnd type="triangle"/>
+          </a:ln>
+        </p:spPr>
+        <p:style>
+          <a:lnRef idx="1">
+            <a:schemeClr val="accent1"/>
+          </a:lnRef>
+          <a:fillRef idx="0">
+            <a:schemeClr val="accent1"/>
+          </a:fillRef>
+          <a:effectRef idx="0">
+            <a:schemeClr val="accent1"/>
+          </a:effectRef>
+          <a:fontRef idx="minor">
+            <a:schemeClr val="tx1"/>
+          </a:fontRef>
+        </p:style>
+      </p:cxnSp>
+      <p:cxnSp>
+        <p:nvCxnSpPr>
+          <p:cNvPr id="40" name="Rett pilkobling 39">
+            <a:extLst>
+              <a:ext uri="{FF2B5EF4-FFF2-40B4-BE49-F238E27FC236}">
+                <a16:creationId xmlns:a16="http://schemas.microsoft.com/office/drawing/2014/main" id="{0C12DB73-56F0-4CF6-8C01-80C5B7E6AFCD}"/>
+              </a:ext>
+            </a:extLst>
+          </p:cNvPr>
+          <p:cNvCxnSpPr>
+            <a:stCxn id="3" idx="2"/>
+            <a:endCxn id="5" idx="0"/>
+          </p:cNvCxnSpPr>
+          <p:nvPr/>
+        </p:nvCxnSpPr>
+        <p:spPr>
+          <a:xfrm>
+            <a:off x="2583402" y="1514551"/>
+            <a:ext cx="0" cy="749255"/>
+          </a:xfrm>
+          <a:prstGeom prst="straightConnector1">
+            <a:avLst/>
+          </a:prstGeom>
+          <a:ln>
+            <a:tailEnd type="triangle"/>
+          </a:ln>
+        </p:spPr>
+        <p:style>
+          <a:lnRef idx="1">
+            <a:schemeClr val="accent1"/>
+          </a:lnRef>
+          <a:fillRef idx="0">
+            <a:schemeClr val="accent1"/>
+          </a:fillRef>
+          <a:effectRef idx="0">
+            <a:schemeClr val="accent1"/>
+          </a:effectRef>
+          <a:fontRef idx="minor">
+            <a:schemeClr val="tx1"/>
+          </a:fontRef>
+        </p:style>
+      </p:cxnSp>
+      <p:sp>
+        <p:nvSpPr>
+          <p:cNvPr id="41" name="TekstSylinder 40">
+            <a:extLst>
+              <a:ext uri="{FF2B5EF4-FFF2-40B4-BE49-F238E27FC236}">
+                <a16:creationId xmlns:a16="http://schemas.microsoft.com/office/drawing/2014/main" id="{6C51A316-2551-49AB-92BA-7415F662E613}"/>
+              </a:ext>
+            </a:extLst>
+          </p:cNvPr>
+          <p:cNvSpPr txBox="1"/>
+          <p:nvPr/>
+        </p:nvSpPr>
+        <p:spPr>
+          <a:xfrm>
+            <a:off x="4390007" y="1156290"/>
+            <a:ext cx="1695635" cy="369332"/>
+          </a:xfrm>
+          <a:prstGeom prst="rect">
+            <a:avLst/>
+          </a:prstGeom>
+          <a:noFill/>
+        </p:spPr>
+        <p:txBody>
+          <a:bodyPr wrap="square" rtlCol="0">
+            <a:spAutoFit/>
+          </a:bodyPr>
+          <a:lstStyle/>
+          <a:p>
+            <a:pPr algn="ctr"/>
+            <a:r>
+              <a:rPr lang="nb-NO" dirty="0"/>
+              <a:t>Visualisering</a:t>
+            </a:r>
+          </a:p>
+        </p:txBody>
+      </p:sp>
+      <p:cxnSp>
+        <p:nvCxnSpPr>
+          <p:cNvPr id="44" name="Rett pilkobling 43">
+            <a:extLst>
+              <a:ext uri="{FF2B5EF4-FFF2-40B4-BE49-F238E27FC236}">
+                <a16:creationId xmlns:a16="http://schemas.microsoft.com/office/drawing/2014/main" id="{1D7B7BF3-7F1E-4764-B65F-FF10AD792A32}"/>
+              </a:ext>
+            </a:extLst>
+          </p:cNvPr>
+          <p:cNvCxnSpPr>
+            <a:stCxn id="2" idx="2"/>
+            <a:endCxn id="41" idx="0"/>
+          </p:cNvCxnSpPr>
+          <p:nvPr/>
+        </p:nvCxnSpPr>
+        <p:spPr>
+          <a:xfrm>
+            <a:off x="5237825" y="635662"/>
+            <a:ext cx="0" cy="520628"/>
+          </a:xfrm>
+          <a:prstGeom prst="straightConnector1">
+            <a:avLst/>
+          </a:prstGeom>
+          <a:ln>
+            <a:tailEnd type="triangle"/>
+          </a:ln>
+        </p:spPr>
+        <p:style>
+          <a:lnRef idx="1">
+            <a:schemeClr val="accent1"/>
+          </a:lnRef>
+          <a:fillRef idx="0">
+            <a:schemeClr val="accent1"/>
+          </a:fillRef>
+          <a:effectRef idx="0">
+            <a:schemeClr val="accent1"/>
+          </a:effectRef>
+          <a:fontRef idx="minor">
+            <a:schemeClr val="tx1"/>
+          </a:fontRef>
+        </p:style>
+      </p:cxnSp>
+    </p:spTree>
+    <p:extLst>
+      <p:ext uri="{BB962C8B-B14F-4D97-AF65-F5344CB8AC3E}">
+        <p14:creationId xmlns:p14="http://schemas.microsoft.com/office/powerpoint/2010/main" val="392014652"/>
       </p:ext>
     </p:extLst>
   </p:cSld>

</xml_diff>

<commit_message>
foreløpig ferdig med presentasjon
</commit_message>
<xml_diff>
--- a/presentation/presbiosim.pptx
+++ b/presentation/presbiosim.pptx
@@ -6,13 +6,17 @@
   </p:sldMasterIdLst>
   <p:sldIdLst>
     <p:sldId id="256" r:id="rId2"/>
-    <p:sldId id="258" r:id="rId3"/>
-    <p:sldId id="257" r:id="rId4"/>
-    <p:sldId id="259" r:id="rId5"/>
-    <p:sldId id="260" r:id="rId6"/>
-    <p:sldId id="261" r:id="rId7"/>
-    <p:sldId id="262" r:id="rId8"/>
-    <p:sldId id="263" r:id="rId9"/>
+    <p:sldId id="259" r:id="rId3"/>
+    <p:sldId id="258" r:id="rId4"/>
+    <p:sldId id="257" r:id="rId5"/>
+    <p:sldId id="261" r:id="rId6"/>
+    <p:sldId id="262" r:id="rId7"/>
+    <p:sldId id="263" r:id="rId8"/>
+    <p:sldId id="264" r:id="rId9"/>
+    <p:sldId id="260" r:id="rId10"/>
+    <p:sldId id="266" r:id="rId11"/>
+    <p:sldId id="267" r:id="rId12"/>
+    <p:sldId id="265" r:id="rId13"/>
   </p:sldIdLst>
   <p:sldSz cx="12192000" cy="6858000"/>
   <p:notesSz cx="6858000" cy="9144000"/>
@@ -845,7 +849,7 @@
           <a:p>
             <a:fld id="{3A477E78-E505-4A2A-AF94-BFCFB837C73E}" type="datetimeFigureOut">
               <a:rPr lang="nb-NO" smtClean="0"/>
-              <a:t>25.01.2018</a:t>
+              <a:t>26.01.2018</a:t>
             </a:fld>
             <a:endParaRPr lang="nb-NO"/>
           </a:p>
@@ -1096,7 +1100,7 @@
           <a:p>
             <a:fld id="{3A477E78-E505-4A2A-AF94-BFCFB837C73E}" type="datetimeFigureOut">
               <a:rPr lang="nb-NO" smtClean="0"/>
-              <a:t>25.01.2018</a:t>
+              <a:t>26.01.2018</a:t>
             </a:fld>
             <a:endParaRPr lang="nb-NO"/>
           </a:p>
@@ -1410,7 +1414,7 @@
           <a:p>
             <a:fld id="{3A477E78-E505-4A2A-AF94-BFCFB837C73E}" type="datetimeFigureOut">
               <a:rPr lang="nb-NO" smtClean="0"/>
-              <a:t>25.01.2018</a:t>
+              <a:t>26.01.2018</a:t>
             </a:fld>
             <a:endParaRPr lang="nb-NO"/>
           </a:p>
@@ -1751,7 +1755,7 @@
           <a:p>
             <a:fld id="{3A477E78-E505-4A2A-AF94-BFCFB837C73E}" type="datetimeFigureOut">
               <a:rPr lang="nb-NO" smtClean="0"/>
-              <a:t>25.01.2018</a:t>
+              <a:t>26.01.2018</a:t>
             </a:fld>
             <a:endParaRPr lang="nb-NO"/>
           </a:p>
@@ -2065,7 +2069,7 @@
           <a:p>
             <a:fld id="{3A477E78-E505-4A2A-AF94-BFCFB837C73E}" type="datetimeFigureOut">
               <a:rPr lang="nb-NO" smtClean="0"/>
-              <a:t>25.01.2018</a:t>
+              <a:t>26.01.2018</a:t>
             </a:fld>
             <a:endParaRPr lang="nb-NO"/>
           </a:p>
@@ -2458,7 +2462,7 @@
           <a:p>
             <a:fld id="{3A477E78-E505-4A2A-AF94-BFCFB837C73E}" type="datetimeFigureOut">
               <a:rPr lang="nb-NO" smtClean="0"/>
-              <a:t>25.01.2018</a:t>
+              <a:t>26.01.2018</a:t>
             </a:fld>
             <a:endParaRPr lang="nb-NO"/>
           </a:p>
@@ -2628,7 +2632,7 @@
           <a:p>
             <a:fld id="{3A477E78-E505-4A2A-AF94-BFCFB837C73E}" type="datetimeFigureOut">
               <a:rPr lang="nb-NO" smtClean="0"/>
-              <a:t>25.01.2018</a:t>
+              <a:t>26.01.2018</a:t>
             </a:fld>
             <a:endParaRPr lang="nb-NO"/>
           </a:p>
@@ -2808,7 +2812,7 @@
           <a:p>
             <a:fld id="{3A477E78-E505-4A2A-AF94-BFCFB837C73E}" type="datetimeFigureOut">
               <a:rPr lang="nb-NO" smtClean="0"/>
-              <a:t>25.01.2018</a:t>
+              <a:t>26.01.2018</a:t>
             </a:fld>
             <a:endParaRPr lang="nb-NO"/>
           </a:p>
@@ -2984,7 +2988,7 @@
           <a:p>
             <a:fld id="{3A477E78-E505-4A2A-AF94-BFCFB837C73E}" type="datetimeFigureOut">
               <a:rPr lang="nb-NO" smtClean="0"/>
-              <a:t>25.01.2018</a:t>
+              <a:t>26.01.2018</a:t>
             </a:fld>
             <a:endParaRPr lang="nb-NO"/>
           </a:p>
@@ -3231,7 +3235,7 @@
           <a:p>
             <a:fld id="{3A477E78-E505-4A2A-AF94-BFCFB837C73E}" type="datetimeFigureOut">
               <a:rPr lang="nb-NO" smtClean="0"/>
-              <a:t>25.01.2018</a:t>
+              <a:t>26.01.2018</a:t>
             </a:fld>
             <a:endParaRPr lang="nb-NO"/>
           </a:p>
@@ -3463,7 +3467,7 @@
           <a:p>
             <a:fld id="{3A477E78-E505-4A2A-AF94-BFCFB837C73E}" type="datetimeFigureOut">
               <a:rPr lang="nb-NO" smtClean="0"/>
-              <a:t>25.01.2018</a:t>
+              <a:t>26.01.2018</a:t>
             </a:fld>
             <a:endParaRPr lang="nb-NO"/>
           </a:p>
@@ -3837,7 +3841,7 @@
           <a:p>
             <a:fld id="{3A477E78-E505-4A2A-AF94-BFCFB837C73E}" type="datetimeFigureOut">
               <a:rPr lang="nb-NO" smtClean="0"/>
-              <a:t>25.01.2018</a:t>
+              <a:t>26.01.2018</a:t>
             </a:fld>
             <a:endParaRPr lang="nb-NO"/>
           </a:p>
@@ -3960,7 +3964,7 @@
           <a:p>
             <a:fld id="{3A477E78-E505-4A2A-AF94-BFCFB837C73E}" type="datetimeFigureOut">
               <a:rPr lang="nb-NO" smtClean="0"/>
-              <a:t>25.01.2018</a:t>
+              <a:t>26.01.2018</a:t>
             </a:fld>
             <a:endParaRPr lang="nb-NO"/>
           </a:p>
@@ -4055,7 +4059,7 @@
           <a:p>
             <a:fld id="{3A477E78-E505-4A2A-AF94-BFCFB837C73E}" type="datetimeFigureOut">
               <a:rPr lang="nb-NO" smtClean="0"/>
-              <a:t>25.01.2018</a:t>
+              <a:t>26.01.2018</a:t>
             </a:fld>
             <a:endParaRPr lang="nb-NO"/>
           </a:p>
@@ -4310,7 +4314,7 @@
           <a:p>
             <a:fld id="{3A477E78-E505-4A2A-AF94-BFCFB837C73E}" type="datetimeFigureOut">
               <a:rPr lang="nb-NO" smtClean="0"/>
-              <a:t>25.01.2018</a:t>
+              <a:t>26.01.2018</a:t>
             </a:fld>
             <a:endParaRPr lang="nb-NO"/>
           </a:p>
@@ -4573,7 +4577,7 @@
           <a:p>
             <a:fld id="{3A477E78-E505-4A2A-AF94-BFCFB837C73E}" type="datetimeFigureOut">
               <a:rPr lang="nb-NO" smtClean="0"/>
-              <a:t>25.01.2018</a:t>
+              <a:t>26.01.2018</a:t>
             </a:fld>
             <a:endParaRPr lang="nb-NO"/>
           </a:p>
@@ -5316,7 +5320,7 @@
           <a:p>
             <a:fld id="{3A477E78-E505-4A2A-AF94-BFCFB837C73E}" type="datetimeFigureOut">
               <a:rPr lang="nb-NO" smtClean="0"/>
-              <a:t>25.01.2018</a:t>
+              <a:t>26.01.2018</a:t>
             </a:fld>
             <a:endParaRPr lang="nb-NO"/>
           </a:p>
@@ -5903,7 +5907,7 @@
             <a:pPr algn="ctr"/>
             <a:r>
               <a:rPr lang="nb-NO" dirty="0"/>
-              <a:t>Lars Martin Lied og Jon-Fredrik Cappelen</a:t>
+              <a:t>Jon-Fredrik Cappelen og Lars Martin Lied </a:t>
             </a:r>
           </a:p>
         </p:txBody>
@@ -5921,7 +5925,1278 @@
 </p:sld>
 </file>
 
+<file path=ppt/slides/slide10.xml><?xml version="1.0" encoding="utf-8"?>
+<p:sld xmlns:a="http://schemas.openxmlformats.org/drawingml/2006/main" xmlns:r="http://schemas.openxmlformats.org/officeDocument/2006/relationships" xmlns:p="http://schemas.openxmlformats.org/presentationml/2006/main">
+  <p:cSld>
+    <p:spTree>
+      <p:nvGrpSpPr>
+        <p:cNvPr id="1" name=""/>
+        <p:cNvGrpSpPr/>
+        <p:nvPr/>
+      </p:nvGrpSpPr>
+      <p:grpSpPr>
+        <a:xfrm>
+          <a:off x="0" y="0"/>
+          <a:ext cx="0" cy="0"/>
+          <a:chOff x="0" y="0"/>
+          <a:chExt cx="0" cy="0"/>
+        </a:xfrm>
+      </p:grpSpPr>
+      <p:sp>
+        <p:nvSpPr>
+          <p:cNvPr id="2" name="Tittel 1">
+            <a:extLst>
+              <a:ext uri="{FF2B5EF4-FFF2-40B4-BE49-F238E27FC236}">
+                <a16:creationId xmlns:a16="http://schemas.microsoft.com/office/drawing/2014/main" id="{55CBEA7E-0205-4F17-8C6A-A5DE1410DF76}"/>
+              </a:ext>
+            </a:extLst>
+          </p:cNvPr>
+          <p:cNvSpPr>
+            <a:spLocks noGrp="1"/>
+          </p:cNvSpPr>
+          <p:nvPr>
+            <p:ph type="title"/>
+          </p:nvPr>
+        </p:nvSpPr>
+        <p:spPr/>
+        <p:txBody>
+          <a:bodyPr/>
+          <a:lstStyle/>
+          <a:p>
+            <a:endParaRPr lang="nb-NO"/>
+          </a:p>
+        </p:txBody>
+      </p:sp>
+      <p:sp>
+        <p:nvSpPr>
+          <p:cNvPr id="3" name="Plassholder for innhold 2">
+            <a:extLst>
+              <a:ext uri="{FF2B5EF4-FFF2-40B4-BE49-F238E27FC236}">
+                <a16:creationId xmlns:a16="http://schemas.microsoft.com/office/drawing/2014/main" id="{70BD9E81-F0BB-4712-AFF4-7D4DDF043348}"/>
+              </a:ext>
+            </a:extLst>
+          </p:cNvPr>
+          <p:cNvSpPr>
+            <a:spLocks noGrp="1"/>
+          </p:cNvSpPr>
+          <p:nvPr>
+            <p:ph idx="1"/>
+          </p:nvPr>
+        </p:nvSpPr>
+        <p:spPr/>
+        <p:txBody>
+          <a:bodyPr/>
+          <a:lstStyle/>
+          <a:p>
+            <a:endParaRPr lang="nb-NO"/>
+          </a:p>
+        </p:txBody>
+      </p:sp>
+      <p:pic>
+        <p:nvPicPr>
+          <p:cNvPr id="4" name="Plassholder for innhold 4">
+            <a:extLst>
+              <a:ext uri="{FF2B5EF4-FFF2-40B4-BE49-F238E27FC236}">
+                <a16:creationId xmlns:a16="http://schemas.microsoft.com/office/drawing/2014/main" id="{1F125D42-5DE0-4ADD-8E55-0B5D87EC44C5}"/>
+              </a:ext>
+            </a:extLst>
+          </p:cNvPr>
+          <p:cNvPicPr>
+            <a:picLocks noChangeAspect="1"/>
+          </p:cNvPicPr>
+          <p:nvPr/>
+        </p:nvPicPr>
+        <p:blipFill>
+          <a:blip r:embed="rId2">
+            <a:extLst>
+              <a:ext uri="{28A0092B-C50C-407E-A947-70E740481C1C}">
+                <a14:useLocalDpi xmlns:a14="http://schemas.microsoft.com/office/drawing/2010/main" val="0"/>
+              </a:ext>
+            </a:extLst>
+          </a:blip>
+          <a:stretch>
+            <a:fillRect/>
+          </a:stretch>
+        </p:blipFill>
+        <p:spPr>
+          <a:xfrm>
+            <a:off x="2719711" y="407025"/>
+            <a:ext cx="5324475" cy="5974582"/>
+          </a:xfrm>
+          <a:prstGeom prst="rect">
+            <a:avLst/>
+          </a:prstGeom>
+        </p:spPr>
+      </p:pic>
+    </p:spTree>
+    <p:extLst>
+      <p:ext uri="{BB962C8B-B14F-4D97-AF65-F5344CB8AC3E}">
+        <p14:creationId xmlns:p14="http://schemas.microsoft.com/office/powerpoint/2010/main" val="2987536959"/>
+      </p:ext>
+    </p:extLst>
+  </p:cSld>
+  <p:clrMapOvr>
+    <a:masterClrMapping/>
+  </p:clrMapOvr>
+</p:sld>
+</file>
+
+<file path=ppt/slides/slide11.xml><?xml version="1.0" encoding="utf-8"?>
+<p:sld xmlns:a="http://schemas.openxmlformats.org/drawingml/2006/main" xmlns:r="http://schemas.openxmlformats.org/officeDocument/2006/relationships" xmlns:p="http://schemas.openxmlformats.org/presentationml/2006/main">
+  <p:cSld>
+    <p:spTree>
+      <p:nvGrpSpPr>
+        <p:cNvPr id="1" name=""/>
+        <p:cNvGrpSpPr/>
+        <p:nvPr/>
+      </p:nvGrpSpPr>
+      <p:grpSpPr>
+        <a:xfrm>
+          <a:off x="0" y="0"/>
+          <a:ext cx="0" cy="0"/>
+          <a:chOff x="0" y="0"/>
+          <a:chExt cx="0" cy="0"/>
+        </a:xfrm>
+      </p:grpSpPr>
+      <p:pic>
+        <p:nvPicPr>
+          <p:cNvPr id="2" name="Rossumoya">
+            <a:hlinkClick r:id="" action="ppaction://media"/>
+            <a:extLst>
+              <a:ext uri="{FF2B5EF4-FFF2-40B4-BE49-F238E27FC236}">
+                <a16:creationId xmlns:a16="http://schemas.microsoft.com/office/drawing/2014/main" id="{CA7620DE-AB45-44E0-B087-BF2371DA5CA1}"/>
+              </a:ext>
+            </a:extLst>
+          </p:cNvPr>
+          <p:cNvPicPr>
+            <a:picLocks noChangeAspect="1"/>
+          </p:cNvPicPr>
+          <p:nvPr>
+            <a:videoFile r:link="rId2"/>
+            <p:extLst>
+              <p:ext uri="{DAA4B4D4-6D71-4841-9C94-3DE7FCFB9230}">
+                <p14:media xmlns:p14="http://schemas.microsoft.com/office/powerpoint/2010/main" r:embed="rId1"/>
+              </p:ext>
+            </p:extLst>
+          </p:nvPr>
+        </p:nvPicPr>
+        <p:blipFill>
+          <a:blip r:embed="rId4"/>
+          <a:stretch>
+            <a:fillRect/>
+          </a:stretch>
+        </p:blipFill>
+        <p:spPr>
+          <a:xfrm>
+            <a:off x="816746" y="293789"/>
+            <a:ext cx="8469296" cy="6351972"/>
+          </a:xfrm>
+          <a:prstGeom prst="rect">
+            <a:avLst/>
+          </a:prstGeom>
+        </p:spPr>
+      </p:pic>
+    </p:spTree>
+    <p:extLst>
+      <p:ext uri="{BB962C8B-B14F-4D97-AF65-F5344CB8AC3E}">
+        <p14:creationId xmlns:p14="http://schemas.microsoft.com/office/powerpoint/2010/main" val="530460389"/>
+      </p:ext>
+    </p:extLst>
+  </p:cSld>
+  <p:clrMapOvr>
+    <a:masterClrMapping/>
+  </p:clrMapOvr>
+  <p:timing>
+    <p:tnLst>
+      <p:par>
+        <p:cTn id="1" dur="indefinite" restart="never" nodeType="tmRoot">
+          <p:childTnLst>
+            <p:seq concurrent="1" nextAc="seek">
+              <p:cTn id="2" restart="whenNotActive" fill="hold" evtFilter="cancelBubble" nodeType="interactiveSeq">
+                <p:stCondLst>
+                  <p:cond evt="onClick" delay="0">
+                    <p:tgtEl>
+                      <p:spTgt spid="2"/>
+                    </p:tgtEl>
+                  </p:cond>
+                </p:stCondLst>
+                <p:endSync evt="end" delay="0">
+                  <p:rtn val="all"/>
+                </p:endSync>
+                <p:childTnLst>
+                  <p:par>
+                    <p:cTn id="3" fill="hold">
+                      <p:stCondLst>
+                        <p:cond delay="0"/>
+                      </p:stCondLst>
+                      <p:childTnLst>
+                        <p:par>
+                          <p:cTn id="4" fill="hold">
+                            <p:stCondLst>
+                              <p:cond delay="0"/>
+                            </p:stCondLst>
+                            <p:childTnLst>
+                              <p:par>
+                                <p:cTn id="5" presetID="2" presetClass="mediacall" presetSubtype="0" fill="hold" nodeType="clickEffect">
+                                  <p:stCondLst>
+                                    <p:cond delay="0"/>
+                                  </p:stCondLst>
+                                  <p:childTnLst>
+                                    <p:cmd type="call" cmd="togglePause">
+                                      <p:cBhvr>
+                                        <p:cTn id="6" dur="1" fill="hold"/>
+                                        <p:tgtEl>
+                                          <p:spTgt spid="2"/>
+                                        </p:tgtEl>
+                                      </p:cBhvr>
+                                    </p:cmd>
+                                  </p:childTnLst>
+                                </p:cTn>
+                              </p:par>
+                            </p:childTnLst>
+                          </p:cTn>
+                        </p:par>
+                      </p:childTnLst>
+                    </p:cTn>
+                  </p:par>
+                </p:childTnLst>
+              </p:cTn>
+              <p:nextCondLst>
+                <p:cond evt="onClick" delay="0">
+                  <p:tgtEl>
+                    <p:spTgt spid="2"/>
+                  </p:tgtEl>
+                </p:cond>
+              </p:nextCondLst>
+            </p:seq>
+            <p:video>
+              <p:cMediaNode vol="80000">
+                <p:cTn id="7" fill="hold" display="0">
+                  <p:stCondLst>
+                    <p:cond delay="indefinite"/>
+                  </p:stCondLst>
+                </p:cTn>
+                <p:tgtEl>
+                  <p:spTgt spid="2"/>
+                </p:tgtEl>
+              </p:cMediaNode>
+            </p:video>
+          </p:childTnLst>
+        </p:cTn>
+      </p:par>
+    </p:tnLst>
+  </p:timing>
+</p:sld>
+</file>
+
+<file path=ppt/slides/slide12.xml><?xml version="1.0" encoding="utf-8"?>
+<p:sld xmlns:a="http://schemas.openxmlformats.org/drawingml/2006/main" xmlns:r="http://schemas.openxmlformats.org/officeDocument/2006/relationships" xmlns:p="http://schemas.openxmlformats.org/presentationml/2006/main">
+  <p:cSld>
+    <p:spTree>
+      <p:nvGrpSpPr>
+        <p:cNvPr id="1" name=""/>
+        <p:cNvGrpSpPr/>
+        <p:nvPr/>
+      </p:nvGrpSpPr>
+      <p:grpSpPr>
+        <a:xfrm>
+          <a:off x="0" y="0"/>
+          <a:ext cx="0" cy="0"/>
+          <a:chOff x="0" y="0"/>
+          <a:chExt cx="0" cy="0"/>
+        </a:xfrm>
+      </p:grpSpPr>
+      <p:pic>
+        <p:nvPicPr>
+          <p:cNvPr id="3" name="Bilde 2">
+            <a:extLst>
+              <a:ext uri="{FF2B5EF4-FFF2-40B4-BE49-F238E27FC236}">
+                <a16:creationId xmlns:a16="http://schemas.microsoft.com/office/drawing/2014/main" id="{69E2F1B1-C220-408C-B003-A6544D8CE3C9}"/>
+              </a:ext>
+            </a:extLst>
+          </p:cNvPr>
+          <p:cNvPicPr>
+            <a:picLocks noChangeAspect="1"/>
+          </p:cNvPicPr>
+          <p:nvPr/>
+        </p:nvPicPr>
+        <p:blipFill>
+          <a:blip r:embed="rId2">
+            <a:extLst>
+              <a:ext uri="{28A0092B-C50C-407E-A947-70E740481C1C}">
+                <a14:useLocalDpi xmlns:a14="http://schemas.microsoft.com/office/drawing/2010/main" val="0"/>
+              </a:ext>
+            </a:extLst>
+          </a:blip>
+          <a:stretch>
+            <a:fillRect/>
+          </a:stretch>
+        </p:blipFill>
+        <p:spPr>
+          <a:xfrm>
+            <a:off x="841554" y="186409"/>
+            <a:ext cx="10508891" cy="6485182"/>
+          </a:xfrm>
+          <a:prstGeom prst="rect">
+            <a:avLst/>
+          </a:prstGeom>
+        </p:spPr>
+      </p:pic>
+    </p:spTree>
+    <p:extLst>
+      <p:ext uri="{BB962C8B-B14F-4D97-AF65-F5344CB8AC3E}">
+        <p14:creationId xmlns:p14="http://schemas.microsoft.com/office/powerpoint/2010/main" val="3555493245"/>
+      </p:ext>
+    </p:extLst>
+  </p:cSld>
+  <p:clrMapOvr>
+    <a:masterClrMapping/>
+  </p:clrMapOvr>
+</p:sld>
+</file>
+
 <file path=ppt/slides/slide2.xml><?xml version="1.0" encoding="utf-8"?>
+<p:sld xmlns:a="http://schemas.openxmlformats.org/drawingml/2006/main" xmlns:r="http://schemas.openxmlformats.org/officeDocument/2006/relationships" xmlns:p="http://schemas.openxmlformats.org/presentationml/2006/main">
+  <p:cSld>
+    <p:spTree>
+      <p:nvGrpSpPr>
+        <p:cNvPr id="1" name=""/>
+        <p:cNvGrpSpPr/>
+        <p:nvPr/>
+      </p:nvGrpSpPr>
+      <p:grpSpPr>
+        <a:xfrm>
+          <a:off x="0" y="0"/>
+          <a:ext cx="0" cy="0"/>
+          <a:chOff x="0" y="0"/>
+          <a:chExt cx="0" cy="0"/>
+        </a:xfrm>
+      </p:grpSpPr>
+      <p:sp>
+        <p:nvSpPr>
+          <p:cNvPr id="2" name="TekstSylinder 1">
+            <a:extLst>
+              <a:ext uri="{FF2B5EF4-FFF2-40B4-BE49-F238E27FC236}">
+                <a16:creationId xmlns:a16="http://schemas.microsoft.com/office/drawing/2014/main" id="{D6E4240E-CE1D-4E1D-A80F-8BB86C94CE72}"/>
+              </a:ext>
+            </a:extLst>
+          </p:cNvPr>
+          <p:cNvSpPr txBox="1"/>
+          <p:nvPr/>
+        </p:nvSpPr>
+        <p:spPr>
+          <a:xfrm>
+            <a:off x="4083728" y="266330"/>
+            <a:ext cx="2308194" cy="369332"/>
+          </a:xfrm>
+          <a:prstGeom prst="rect">
+            <a:avLst/>
+          </a:prstGeom>
+          <a:noFill/>
+        </p:spPr>
+        <p:txBody>
+          <a:bodyPr wrap="square" rtlCol="0">
+            <a:spAutoFit/>
+          </a:bodyPr>
+          <a:lstStyle/>
+          <a:p>
+            <a:pPr algn="ctr"/>
+            <a:r>
+              <a:rPr lang="nb-NO" dirty="0" err="1"/>
+              <a:t>BioSim</a:t>
+            </a:r>
+            <a:endParaRPr lang="nb-NO" dirty="0"/>
+          </a:p>
+        </p:txBody>
+      </p:sp>
+      <p:sp>
+        <p:nvSpPr>
+          <p:cNvPr id="3" name="TekstSylinder 2">
+            <a:extLst>
+              <a:ext uri="{FF2B5EF4-FFF2-40B4-BE49-F238E27FC236}">
+                <a16:creationId xmlns:a16="http://schemas.microsoft.com/office/drawing/2014/main" id="{8CFC9723-D149-4897-9D86-841E13928976}"/>
+              </a:ext>
+            </a:extLst>
+          </p:cNvPr>
+          <p:cNvSpPr txBox="1"/>
+          <p:nvPr/>
+        </p:nvSpPr>
+        <p:spPr>
+          <a:xfrm>
+            <a:off x="1606858" y="1145219"/>
+            <a:ext cx="1953088" cy="369332"/>
+          </a:xfrm>
+          <a:prstGeom prst="rect">
+            <a:avLst/>
+          </a:prstGeom>
+          <a:noFill/>
+        </p:spPr>
+        <p:txBody>
+          <a:bodyPr wrap="square" rtlCol="0">
+            <a:spAutoFit/>
+          </a:bodyPr>
+          <a:lstStyle/>
+          <a:p>
+            <a:pPr algn="ctr"/>
+            <a:r>
+              <a:rPr lang="nb-NO" dirty="0"/>
+              <a:t>Island</a:t>
+            </a:r>
+          </a:p>
+        </p:txBody>
+      </p:sp>
+      <p:sp>
+        <p:nvSpPr>
+          <p:cNvPr id="4" name="TekstSylinder 3">
+            <a:extLst>
+              <a:ext uri="{FF2B5EF4-FFF2-40B4-BE49-F238E27FC236}">
+                <a16:creationId xmlns:a16="http://schemas.microsoft.com/office/drawing/2014/main" id="{03D37941-03BB-4D2A-A6D2-9E20681D4A28}"/>
+              </a:ext>
+            </a:extLst>
+          </p:cNvPr>
+          <p:cNvSpPr txBox="1"/>
+          <p:nvPr/>
+        </p:nvSpPr>
+        <p:spPr>
+          <a:xfrm>
+            <a:off x="6684883" y="1145219"/>
+            <a:ext cx="1935332" cy="369332"/>
+          </a:xfrm>
+          <a:prstGeom prst="rect">
+            <a:avLst/>
+          </a:prstGeom>
+          <a:noFill/>
+        </p:spPr>
+        <p:txBody>
+          <a:bodyPr wrap="square" rtlCol="0">
+            <a:spAutoFit/>
+          </a:bodyPr>
+          <a:lstStyle/>
+          <a:p>
+            <a:pPr algn="ctr"/>
+            <a:r>
+              <a:rPr lang="nb-NO" dirty="0"/>
+              <a:t>Simulering</a:t>
+            </a:r>
+          </a:p>
+        </p:txBody>
+      </p:sp>
+      <p:sp>
+        <p:nvSpPr>
+          <p:cNvPr id="5" name="TekstSylinder 4">
+            <a:extLst>
+              <a:ext uri="{FF2B5EF4-FFF2-40B4-BE49-F238E27FC236}">
+                <a16:creationId xmlns:a16="http://schemas.microsoft.com/office/drawing/2014/main" id="{69DC1C5E-F647-453E-B635-C4D625CFB549}"/>
+              </a:ext>
+            </a:extLst>
+          </p:cNvPr>
+          <p:cNvSpPr txBox="1"/>
+          <p:nvPr/>
+        </p:nvSpPr>
+        <p:spPr>
+          <a:xfrm>
+            <a:off x="1651246" y="2263806"/>
+            <a:ext cx="1864311" cy="369332"/>
+          </a:xfrm>
+          <a:prstGeom prst="rect">
+            <a:avLst/>
+          </a:prstGeom>
+          <a:noFill/>
+        </p:spPr>
+        <p:txBody>
+          <a:bodyPr wrap="square" rtlCol="0">
+            <a:spAutoFit/>
+          </a:bodyPr>
+          <a:lstStyle/>
+          <a:p>
+            <a:pPr algn="ctr"/>
+            <a:r>
+              <a:rPr lang="nb-NO" dirty="0"/>
+              <a:t>Landscapes</a:t>
+            </a:r>
+          </a:p>
+        </p:txBody>
+      </p:sp>
+      <p:sp>
+        <p:nvSpPr>
+          <p:cNvPr id="7" name="TekstSylinder 6">
+            <a:extLst>
+              <a:ext uri="{FF2B5EF4-FFF2-40B4-BE49-F238E27FC236}">
+                <a16:creationId xmlns:a16="http://schemas.microsoft.com/office/drawing/2014/main" id="{21253703-21E8-4AE1-8005-E773748993D5}"/>
+              </a:ext>
+            </a:extLst>
+          </p:cNvPr>
+          <p:cNvSpPr txBox="1"/>
+          <p:nvPr/>
+        </p:nvSpPr>
+        <p:spPr>
+          <a:xfrm>
+            <a:off x="1788849" y="4563123"/>
+            <a:ext cx="1589103" cy="381740"/>
+          </a:xfrm>
+          <a:prstGeom prst="rect">
+            <a:avLst/>
+          </a:prstGeom>
+          <a:noFill/>
+        </p:spPr>
+        <p:txBody>
+          <a:bodyPr wrap="square" rtlCol="0">
+            <a:spAutoFit/>
+          </a:bodyPr>
+          <a:lstStyle/>
+          <a:p>
+            <a:pPr algn="ctr"/>
+            <a:r>
+              <a:rPr lang="nb-NO" dirty="0" err="1"/>
+              <a:t>Animals</a:t>
+            </a:r>
+            <a:endParaRPr lang="nb-NO" dirty="0"/>
+          </a:p>
+        </p:txBody>
+      </p:sp>
+      <p:sp>
+        <p:nvSpPr>
+          <p:cNvPr id="10" name="TekstSylinder 9">
+            <a:extLst>
+              <a:ext uri="{FF2B5EF4-FFF2-40B4-BE49-F238E27FC236}">
+                <a16:creationId xmlns:a16="http://schemas.microsoft.com/office/drawing/2014/main" id="{D68A99DC-E29F-4361-A516-695C15AD645B}"/>
+              </a:ext>
+            </a:extLst>
+          </p:cNvPr>
+          <p:cNvSpPr txBox="1"/>
+          <p:nvPr/>
+        </p:nvSpPr>
+        <p:spPr>
+          <a:xfrm>
+            <a:off x="4591973" y="2621587"/>
+            <a:ext cx="1615735" cy="381739"/>
+          </a:xfrm>
+          <a:prstGeom prst="rect">
+            <a:avLst/>
+          </a:prstGeom>
+          <a:noFill/>
+        </p:spPr>
+        <p:txBody>
+          <a:bodyPr wrap="square" rtlCol="0">
+            <a:spAutoFit/>
+          </a:bodyPr>
+          <a:lstStyle/>
+          <a:p>
+            <a:pPr algn="ctr"/>
+            <a:r>
+              <a:rPr lang="nb-NO" dirty="0" err="1"/>
+              <a:t>Jungle</a:t>
+            </a:r>
+            <a:endParaRPr lang="nb-NO" dirty="0"/>
+          </a:p>
+        </p:txBody>
+      </p:sp>
+      <p:sp>
+        <p:nvSpPr>
+          <p:cNvPr id="11" name="TekstSylinder 10">
+            <a:extLst>
+              <a:ext uri="{FF2B5EF4-FFF2-40B4-BE49-F238E27FC236}">
+                <a16:creationId xmlns:a16="http://schemas.microsoft.com/office/drawing/2014/main" id="{C77D06B7-7FE1-4A6C-85E2-5F8D56BAB253}"/>
+              </a:ext>
+            </a:extLst>
+          </p:cNvPr>
+          <p:cNvSpPr txBox="1"/>
+          <p:nvPr/>
+        </p:nvSpPr>
+        <p:spPr>
+          <a:xfrm>
+            <a:off x="4244637" y="3393493"/>
+            <a:ext cx="1233996" cy="369332"/>
+          </a:xfrm>
+          <a:prstGeom prst="rect">
+            <a:avLst/>
+          </a:prstGeom>
+          <a:noFill/>
+        </p:spPr>
+        <p:txBody>
+          <a:bodyPr wrap="square" rtlCol="0">
+            <a:spAutoFit/>
+          </a:bodyPr>
+          <a:lstStyle/>
+          <a:p>
+            <a:r>
+              <a:rPr lang="nb-NO" dirty="0"/>
+              <a:t>Savannah</a:t>
+            </a:r>
+          </a:p>
+        </p:txBody>
+      </p:sp>
+      <p:sp>
+        <p:nvSpPr>
+          <p:cNvPr id="12" name="TekstSylinder 11">
+            <a:extLst>
+              <a:ext uri="{FF2B5EF4-FFF2-40B4-BE49-F238E27FC236}">
+                <a16:creationId xmlns:a16="http://schemas.microsoft.com/office/drawing/2014/main" id="{18F47B8A-844C-463A-815D-8A91AEF26FDC}"/>
+              </a:ext>
+            </a:extLst>
+          </p:cNvPr>
+          <p:cNvSpPr txBox="1"/>
+          <p:nvPr/>
+        </p:nvSpPr>
+        <p:spPr>
+          <a:xfrm>
+            <a:off x="5402061" y="3381536"/>
+            <a:ext cx="1083075" cy="369332"/>
+          </a:xfrm>
+          <a:prstGeom prst="rect">
+            <a:avLst/>
+          </a:prstGeom>
+          <a:noFill/>
+        </p:spPr>
+        <p:txBody>
+          <a:bodyPr wrap="square" rtlCol="0">
+            <a:spAutoFit/>
+          </a:bodyPr>
+          <a:lstStyle/>
+          <a:p>
+            <a:pPr algn="ctr"/>
+            <a:r>
+              <a:rPr lang="nb-NO" dirty="0" err="1"/>
+              <a:t>Desert</a:t>
+            </a:r>
+            <a:endParaRPr lang="nb-NO" dirty="0"/>
+          </a:p>
+        </p:txBody>
+      </p:sp>
+      <p:sp>
+        <p:nvSpPr>
+          <p:cNvPr id="13" name="TekstSylinder 12">
+            <a:extLst>
+              <a:ext uri="{FF2B5EF4-FFF2-40B4-BE49-F238E27FC236}">
+                <a16:creationId xmlns:a16="http://schemas.microsoft.com/office/drawing/2014/main" id="{0FF243F6-F2C9-4AE8-9872-09B6E3F6F88F}"/>
+              </a:ext>
+            </a:extLst>
+          </p:cNvPr>
+          <p:cNvSpPr txBox="1"/>
+          <p:nvPr/>
+        </p:nvSpPr>
+        <p:spPr>
+          <a:xfrm>
+            <a:off x="2824210" y="3007765"/>
+            <a:ext cx="1420427" cy="369332"/>
+          </a:xfrm>
+          <a:prstGeom prst="rect">
+            <a:avLst/>
+          </a:prstGeom>
+          <a:noFill/>
+        </p:spPr>
+        <p:txBody>
+          <a:bodyPr wrap="square" rtlCol="0">
+            <a:spAutoFit/>
+          </a:bodyPr>
+          <a:lstStyle/>
+          <a:p>
+            <a:pPr algn="ctr"/>
+            <a:r>
+              <a:rPr lang="nb-NO" dirty="0" err="1"/>
+              <a:t>Mountain</a:t>
+            </a:r>
+            <a:r>
+              <a:rPr lang="nb-NO" dirty="0"/>
+              <a:t>/</a:t>
+            </a:r>
+          </a:p>
+          <a:p>
+            <a:pPr algn="ctr"/>
+            <a:r>
+              <a:rPr lang="nb-NO" dirty="0"/>
+              <a:t>Ocean</a:t>
+            </a:r>
+          </a:p>
+        </p:txBody>
+      </p:sp>
+      <p:sp>
+        <p:nvSpPr>
+          <p:cNvPr id="15" name="TekstSylinder 14">
+            <a:extLst>
+              <a:ext uri="{FF2B5EF4-FFF2-40B4-BE49-F238E27FC236}">
+                <a16:creationId xmlns:a16="http://schemas.microsoft.com/office/drawing/2014/main" id="{0CF3EBBF-593D-444D-80D9-0A6D8E15FE14}"/>
+              </a:ext>
+            </a:extLst>
+          </p:cNvPr>
+          <p:cNvSpPr txBox="1"/>
+          <p:nvPr/>
+        </p:nvSpPr>
+        <p:spPr>
+          <a:xfrm>
+            <a:off x="4636361" y="5059470"/>
+            <a:ext cx="1571347" cy="369332"/>
+          </a:xfrm>
+          <a:prstGeom prst="rect">
+            <a:avLst/>
+          </a:prstGeom>
+          <a:noFill/>
+        </p:spPr>
+        <p:txBody>
+          <a:bodyPr wrap="square" rtlCol="0">
+            <a:spAutoFit/>
+          </a:bodyPr>
+          <a:lstStyle/>
+          <a:p>
+            <a:pPr algn="ctr"/>
+            <a:r>
+              <a:rPr lang="nb-NO" dirty="0"/>
+              <a:t>Herbivores</a:t>
+            </a:r>
+          </a:p>
+        </p:txBody>
+      </p:sp>
+      <p:sp>
+        <p:nvSpPr>
+          <p:cNvPr id="16" name="TekstSylinder 15">
+            <a:extLst>
+              <a:ext uri="{FF2B5EF4-FFF2-40B4-BE49-F238E27FC236}">
+                <a16:creationId xmlns:a16="http://schemas.microsoft.com/office/drawing/2014/main" id="{7A7CEC24-D009-4935-BD9D-CC6D92882EF7}"/>
+              </a:ext>
+            </a:extLst>
+          </p:cNvPr>
+          <p:cNvSpPr txBox="1"/>
+          <p:nvPr/>
+        </p:nvSpPr>
+        <p:spPr>
+          <a:xfrm>
+            <a:off x="4543144" y="5978364"/>
+            <a:ext cx="1757779" cy="369332"/>
+          </a:xfrm>
+          <a:prstGeom prst="rect">
+            <a:avLst/>
+          </a:prstGeom>
+          <a:noFill/>
+        </p:spPr>
+        <p:txBody>
+          <a:bodyPr wrap="square" rtlCol="0">
+            <a:spAutoFit/>
+          </a:bodyPr>
+          <a:lstStyle/>
+          <a:p>
+            <a:pPr algn="ctr"/>
+            <a:r>
+              <a:rPr lang="nb-NO" dirty="0" err="1"/>
+              <a:t>Carnivores</a:t>
+            </a:r>
+            <a:endParaRPr lang="nb-NO" dirty="0"/>
+          </a:p>
+        </p:txBody>
+      </p:sp>
+      <p:cxnSp>
+        <p:nvCxnSpPr>
+          <p:cNvPr id="18" name="Rett pilkobling 17">
+            <a:extLst>
+              <a:ext uri="{FF2B5EF4-FFF2-40B4-BE49-F238E27FC236}">
+                <a16:creationId xmlns:a16="http://schemas.microsoft.com/office/drawing/2014/main" id="{31898799-E63F-49C4-A366-2C864DA8A1F0}"/>
+              </a:ext>
+            </a:extLst>
+          </p:cNvPr>
+          <p:cNvCxnSpPr>
+            <a:stCxn id="2" idx="2"/>
+            <a:endCxn id="3" idx="0"/>
+          </p:cNvCxnSpPr>
+          <p:nvPr/>
+        </p:nvCxnSpPr>
+        <p:spPr>
+          <a:xfrm flipH="1">
+            <a:off x="2583402" y="635662"/>
+            <a:ext cx="2654423" cy="509557"/>
+          </a:xfrm>
+          <a:prstGeom prst="straightConnector1">
+            <a:avLst/>
+          </a:prstGeom>
+          <a:ln>
+            <a:tailEnd type="triangle"/>
+          </a:ln>
+        </p:spPr>
+        <p:style>
+          <a:lnRef idx="1">
+            <a:schemeClr val="accent1"/>
+          </a:lnRef>
+          <a:fillRef idx="0">
+            <a:schemeClr val="accent1"/>
+          </a:fillRef>
+          <a:effectRef idx="0">
+            <a:schemeClr val="accent1"/>
+          </a:effectRef>
+          <a:fontRef idx="minor">
+            <a:schemeClr val="tx1"/>
+          </a:fontRef>
+        </p:style>
+      </p:cxnSp>
+      <p:cxnSp>
+        <p:nvCxnSpPr>
+          <p:cNvPr id="20" name="Rett pilkobling 19">
+            <a:extLst>
+              <a:ext uri="{FF2B5EF4-FFF2-40B4-BE49-F238E27FC236}">
+                <a16:creationId xmlns:a16="http://schemas.microsoft.com/office/drawing/2014/main" id="{82D0E1F6-1040-4CDD-9482-D935ED7B389F}"/>
+              </a:ext>
+            </a:extLst>
+          </p:cNvPr>
+          <p:cNvCxnSpPr>
+            <a:stCxn id="2" idx="2"/>
+            <a:endCxn id="4" idx="0"/>
+          </p:cNvCxnSpPr>
+          <p:nvPr/>
+        </p:nvCxnSpPr>
+        <p:spPr>
+          <a:xfrm>
+            <a:off x="5237825" y="635662"/>
+            <a:ext cx="2414724" cy="509557"/>
+          </a:xfrm>
+          <a:prstGeom prst="straightConnector1">
+            <a:avLst/>
+          </a:prstGeom>
+          <a:ln>
+            <a:tailEnd type="triangle"/>
+          </a:ln>
+        </p:spPr>
+        <p:style>
+          <a:lnRef idx="1">
+            <a:schemeClr val="accent1"/>
+          </a:lnRef>
+          <a:fillRef idx="0">
+            <a:schemeClr val="accent1"/>
+          </a:fillRef>
+          <a:effectRef idx="0">
+            <a:schemeClr val="accent1"/>
+          </a:effectRef>
+          <a:fontRef idx="minor">
+            <a:schemeClr val="tx1"/>
+          </a:fontRef>
+        </p:style>
+      </p:cxnSp>
+      <p:cxnSp>
+        <p:nvCxnSpPr>
+          <p:cNvPr id="22" name="Rett pilkobling 21">
+            <a:extLst>
+              <a:ext uri="{FF2B5EF4-FFF2-40B4-BE49-F238E27FC236}">
+                <a16:creationId xmlns:a16="http://schemas.microsoft.com/office/drawing/2014/main" id="{8F8C6D0B-A05B-427F-B960-B9FD4C0C81DC}"/>
+              </a:ext>
+            </a:extLst>
+          </p:cNvPr>
+          <p:cNvCxnSpPr>
+            <a:stCxn id="5" idx="3"/>
+            <a:endCxn id="10" idx="0"/>
+          </p:cNvCxnSpPr>
+          <p:nvPr/>
+        </p:nvCxnSpPr>
+        <p:spPr>
+          <a:xfrm>
+            <a:off x="3515557" y="2448472"/>
+            <a:ext cx="1884284" cy="173115"/>
+          </a:xfrm>
+          <a:prstGeom prst="straightConnector1">
+            <a:avLst/>
+          </a:prstGeom>
+          <a:ln>
+            <a:tailEnd type="triangle"/>
+          </a:ln>
+        </p:spPr>
+        <p:style>
+          <a:lnRef idx="1">
+            <a:schemeClr val="accent1"/>
+          </a:lnRef>
+          <a:fillRef idx="0">
+            <a:schemeClr val="accent1"/>
+          </a:fillRef>
+          <a:effectRef idx="0">
+            <a:schemeClr val="accent1"/>
+          </a:effectRef>
+          <a:fontRef idx="minor">
+            <a:schemeClr val="tx1"/>
+          </a:fontRef>
+        </p:style>
+      </p:cxnSp>
+      <p:cxnSp>
+        <p:nvCxnSpPr>
+          <p:cNvPr id="24" name="Rett pilkobling 23">
+            <a:extLst>
+              <a:ext uri="{FF2B5EF4-FFF2-40B4-BE49-F238E27FC236}">
+                <a16:creationId xmlns:a16="http://schemas.microsoft.com/office/drawing/2014/main" id="{CADF50D9-BA52-442C-837C-8668A1E0E6D5}"/>
+              </a:ext>
+            </a:extLst>
+          </p:cNvPr>
+          <p:cNvCxnSpPr>
+            <a:stCxn id="10" idx="2"/>
+            <a:endCxn id="11" idx="0"/>
+          </p:cNvCxnSpPr>
+          <p:nvPr/>
+        </p:nvCxnSpPr>
+        <p:spPr>
+          <a:xfrm flipH="1">
+            <a:off x="4861635" y="3003326"/>
+            <a:ext cx="538206" cy="390167"/>
+          </a:xfrm>
+          <a:prstGeom prst="straightConnector1">
+            <a:avLst/>
+          </a:prstGeom>
+          <a:ln>
+            <a:tailEnd type="triangle"/>
+          </a:ln>
+        </p:spPr>
+        <p:style>
+          <a:lnRef idx="1">
+            <a:schemeClr val="accent1"/>
+          </a:lnRef>
+          <a:fillRef idx="0">
+            <a:schemeClr val="accent1"/>
+          </a:fillRef>
+          <a:effectRef idx="0">
+            <a:schemeClr val="accent1"/>
+          </a:effectRef>
+          <a:fontRef idx="minor">
+            <a:schemeClr val="tx1"/>
+          </a:fontRef>
+        </p:style>
+      </p:cxnSp>
+      <p:cxnSp>
+        <p:nvCxnSpPr>
+          <p:cNvPr id="26" name="Rett pilkobling 25">
+            <a:extLst>
+              <a:ext uri="{FF2B5EF4-FFF2-40B4-BE49-F238E27FC236}">
+                <a16:creationId xmlns:a16="http://schemas.microsoft.com/office/drawing/2014/main" id="{5AFAD022-DAF1-432B-86D2-F75F06F3262E}"/>
+              </a:ext>
+            </a:extLst>
+          </p:cNvPr>
+          <p:cNvCxnSpPr>
+            <a:stCxn id="10" idx="2"/>
+            <a:endCxn id="12" idx="0"/>
+          </p:cNvCxnSpPr>
+          <p:nvPr/>
+        </p:nvCxnSpPr>
+        <p:spPr>
+          <a:xfrm>
+            <a:off x="5399841" y="3003326"/>
+            <a:ext cx="543758" cy="378210"/>
+          </a:xfrm>
+          <a:prstGeom prst="straightConnector1">
+            <a:avLst/>
+          </a:prstGeom>
+          <a:ln>
+            <a:tailEnd type="triangle"/>
+          </a:ln>
+        </p:spPr>
+        <p:style>
+          <a:lnRef idx="1">
+            <a:schemeClr val="accent1"/>
+          </a:lnRef>
+          <a:fillRef idx="0">
+            <a:schemeClr val="accent1"/>
+          </a:fillRef>
+          <a:effectRef idx="0">
+            <a:schemeClr val="accent1"/>
+          </a:effectRef>
+          <a:fontRef idx="minor">
+            <a:schemeClr val="tx1"/>
+          </a:fontRef>
+        </p:style>
+      </p:cxnSp>
+      <p:cxnSp>
+        <p:nvCxnSpPr>
+          <p:cNvPr id="30" name="Rett pilkobling 29">
+            <a:extLst>
+              <a:ext uri="{FF2B5EF4-FFF2-40B4-BE49-F238E27FC236}">
+                <a16:creationId xmlns:a16="http://schemas.microsoft.com/office/drawing/2014/main" id="{D0E70AB2-B168-48F3-A2E7-6CEB31803BE8}"/>
+              </a:ext>
+            </a:extLst>
+          </p:cNvPr>
+          <p:cNvCxnSpPr>
+            <a:cxnSpLocks/>
+            <a:stCxn id="5" idx="2"/>
+            <a:endCxn id="13" idx="0"/>
+          </p:cNvCxnSpPr>
+          <p:nvPr/>
+        </p:nvCxnSpPr>
+        <p:spPr>
+          <a:xfrm>
+            <a:off x="2583402" y="2633138"/>
+            <a:ext cx="951022" cy="374627"/>
+          </a:xfrm>
+          <a:prstGeom prst="straightConnector1">
+            <a:avLst/>
+          </a:prstGeom>
+          <a:ln>
+            <a:tailEnd type="triangle"/>
+          </a:ln>
+        </p:spPr>
+        <p:style>
+          <a:lnRef idx="1">
+            <a:schemeClr val="accent1"/>
+          </a:lnRef>
+          <a:fillRef idx="0">
+            <a:schemeClr val="accent1"/>
+          </a:fillRef>
+          <a:effectRef idx="0">
+            <a:schemeClr val="accent1"/>
+          </a:effectRef>
+          <a:fontRef idx="minor">
+            <a:schemeClr val="tx1"/>
+          </a:fontRef>
+        </p:style>
+      </p:cxnSp>
+      <p:cxnSp>
+        <p:nvCxnSpPr>
+          <p:cNvPr id="33" name="Rett pilkobling 32">
+            <a:extLst>
+              <a:ext uri="{FF2B5EF4-FFF2-40B4-BE49-F238E27FC236}">
+                <a16:creationId xmlns:a16="http://schemas.microsoft.com/office/drawing/2014/main" id="{B3A8AF10-E6E3-45B6-A92B-F5B598A1B08B}"/>
+              </a:ext>
+            </a:extLst>
+          </p:cNvPr>
+          <p:cNvCxnSpPr>
+            <a:stCxn id="5" idx="2"/>
+            <a:endCxn id="7" idx="0"/>
+          </p:cNvCxnSpPr>
+          <p:nvPr/>
+        </p:nvCxnSpPr>
+        <p:spPr>
+          <a:xfrm flipH="1">
+            <a:off x="2583401" y="2633138"/>
+            <a:ext cx="1" cy="1929985"/>
+          </a:xfrm>
+          <a:prstGeom prst="straightConnector1">
+            <a:avLst/>
+          </a:prstGeom>
+          <a:ln>
+            <a:tailEnd type="triangle"/>
+          </a:ln>
+        </p:spPr>
+        <p:style>
+          <a:lnRef idx="1">
+            <a:schemeClr val="accent1"/>
+          </a:lnRef>
+          <a:fillRef idx="0">
+            <a:schemeClr val="accent1"/>
+          </a:fillRef>
+          <a:effectRef idx="0">
+            <a:schemeClr val="accent1"/>
+          </a:effectRef>
+          <a:fontRef idx="minor">
+            <a:schemeClr val="tx1"/>
+          </a:fontRef>
+        </p:style>
+      </p:cxnSp>
+      <p:cxnSp>
+        <p:nvCxnSpPr>
+          <p:cNvPr id="35" name="Rett pilkobling 34">
+            <a:extLst>
+              <a:ext uri="{FF2B5EF4-FFF2-40B4-BE49-F238E27FC236}">
+                <a16:creationId xmlns:a16="http://schemas.microsoft.com/office/drawing/2014/main" id="{5D1D9C24-21B1-4903-ACD9-E3AB7EA473A6}"/>
+              </a:ext>
+            </a:extLst>
+          </p:cNvPr>
+          <p:cNvCxnSpPr>
+            <a:cxnSpLocks/>
+            <a:stCxn id="7" idx="3"/>
+            <a:endCxn id="15" idx="0"/>
+          </p:cNvCxnSpPr>
+          <p:nvPr/>
+        </p:nvCxnSpPr>
+        <p:spPr>
+          <a:xfrm>
+            <a:off x="3377952" y="4753993"/>
+            <a:ext cx="2044083" cy="305477"/>
+          </a:xfrm>
+          <a:prstGeom prst="straightConnector1">
+            <a:avLst/>
+          </a:prstGeom>
+          <a:ln>
+            <a:tailEnd type="triangle"/>
+          </a:ln>
+        </p:spPr>
+        <p:style>
+          <a:lnRef idx="1">
+            <a:schemeClr val="accent1"/>
+          </a:lnRef>
+          <a:fillRef idx="0">
+            <a:schemeClr val="accent1"/>
+          </a:fillRef>
+          <a:effectRef idx="0">
+            <a:schemeClr val="accent1"/>
+          </a:effectRef>
+          <a:fontRef idx="minor">
+            <a:schemeClr val="tx1"/>
+          </a:fontRef>
+        </p:style>
+      </p:cxnSp>
+      <p:cxnSp>
+        <p:nvCxnSpPr>
+          <p:cNvPr id="37" name="Rett pilkobling 36">
+            <a:extLst>
+              <a:ext uri="{FF2B5EF4-FFF2-40B4-BE49-F238E27FC236}">
+                <a16:creationId xmlns:a16="http://schemas.microsoft.com/office/drawing/2014/main" id="{7899A379-2969-44B5-A5D6-C714820E6392}"/>
+              </a:ext>
+            </a:extLst>
+          </p:cNvPr>
+          <p:cNvCxnSpPr>
+            <a:stCxn id="15" idx="2"/>
+            <a:endCxn id="16" idx="0"/>
+          </p:cNvCxnSpPr>
+          <p:nvPr/>
+        </p:nvCxnSpPr>
+        <p:spPr>
+          <a:xfrm flipH="1">
+            <a:off x="5422034" y="5428802"/>
+            <a:ext cx="1" cy="549562"/>
+          </a:xfrm>
+          <a:prstGeom prst="straightConnector1">
+            <a:avLst/>
+          </a:prstGeom>
+          <a:ln>
+            <a:tailEnd type="triangle"/>
+          </a:ln>
+        </p:spPr>
+        <p:style>
+          <a:lnRef idx="1">
+            <a:schemeClr val="accent1"/>
+          </a:lnRef>
+          <a:fillRef idx="0">
+            <a:schemeClr val="accent1"/>
+          </a:fillRef>
+          <a:effectRef idx="0">
+            <a:schemeClr val="accent1"/>
+          </a:effectRef>
+          <a:fontRef idx="minor">
+            <a:schemeClr val="tx1"/>
+          </a:fontRef>
+        </p:style>
+      </p:cxnSp>
+      <p:cxnSp>
+        <p:nvCxnSpPr>
+          <p:cNvPr id="40" name="Rett pilkobling 39">
+            <a:extLst>
+              <a:ext uri="{FF2B5EF4-FFF2-40B4-BE49-F238E27FC236}">
+                <a16:creationId xmlns:a16="http://schemas.microsoft.com/office/drawing/2014/main" id="{0C12DB73-56F0-4CF6-8C01-80C5B7E6AFCD}"/>
+              </a:ext>
+            </a:extLst>
+          </p:cNvPr>
+          <p:cNvCxnSpPr>
+            <a:stCxn id="3" idx="2"/>
+            <a:endCxn id="5" idx="0"/>
+          </p:cNvCxnSpPr>
+          <p:nvPr/>
+        </p:nvCxnSpPr>
+        <p:spPr>
+          <a:xfrm>
+            <a:off x="2583402" y="1514551"/>
+            <a:ext cx="0" cy="749255"/>
+          </a:xfrm>
+          <a:prstGeom prst="straightConnector1">
+            <a:avLst/>
+          </a:prstGeom>
+          <a:ln>
+            <a:tailEnd type="triangle"/>
+          </a:ln>
+        </p:spPr>
+        <p:style>
+          <a:lnRef idx="1">
+            <a:schemeClr val="accent1"/>
+          </a:lnRef>
+          <a:fillRef idx="0">
+            <a:schemeClr val="accent1"/>
+          </a:fillRef>
+          <a:effectRef idx="0">
+            <a:schemeClr val="accent1"/>
+          </a:effectRef>
+          <a:fontRef idx="minor">
+            <a:schemeClr val="tx1"/>
+          </a:fontRef>
+        </p:style>
+      </p:cxnSp>
+      <p:sp>
+        <p:nvSpPr>
+          <p:cNvPr id="41" name="TekstSylinder 40">
+            <a:extLst>
+              <a:ext uri="{FF2B5EF4-FFF2-40B4-BE49-F238E27FC236}">
+                <a16:creationId xmlns:a16="http://schemas.microsoft.com/office/drawing/2014/main" id="{6C51A316-2551-49AB-92BA-7415F662E613}"/>
+              </a:ext>
+            </a:extLst>
+          </p:cNvPr>
+          <p:cNvSpPr txBox="1"/>
+          <p:nvPr/>
+        </p:nvSpPr>
+        <p:spPr>
+          <a:xfrm>
+            <a:off x="4390007" y="1156290"/>
+            <a:ext cx="1695635" cy="369332"/>
+          </a:xfrm>
+          <a:prstGeom prst="rect">
+            <a:avLst/>
+          </a:prstGeom>
+          <a:noFill/>
+        </p:spPr>
+        <p:txBody>
+          <a:bodyPr wrap="square" rtlCol="0">
+            <a:spAutoFit/>
+          </a:bodyPr>
+          <a:lstStyle/>
+          <a:p>
+            <a:pPr algn="ctr"/>
+            <a:r>
+              <a:rPr lang="nb-NO" dirty="0"/>
+              <a:t>Visualisering</a:t>
+            </a:r>
+          </a:p>
+        </p:txBody>
+      </p:sp>
+      <p:cxnSp>
+        <p:nvCxnSpPr>
+          <p:cNvPr id="44" name="Rett pilkobling 43">
+            <a:extLst>
+              <a:ext uri="{FF2B5EF4-FFF2-40B4-BE49-F238E27FC236}">
+                <a16:creationId xmlns:a16="http://schemas.microsoft.com/office/drawing/2014/main" id="{1D7B7BF3-7F1E-4764-B65F-FF10AD792A32}"/>
+              </a:ext>
+            </a:extLst>
+          </p:cNvPr>
+          <p:cNvCxnSpPr>
+            <a:stCxn id="2" idx="2"/>
+            <a:endCxn id="41" idx="0"/>
+          </p:cNvCxnSpPr>
+          <p:nvPr/>
+        </p:nvCxnSpPr>
+        <p:spPr>
+          <a:xfrm>
+            <a:off x="5237825" y="635662"/>
+            <a:ext cx="0" cy="520628"/>
+          </a:xfrm>
+          <a:prstGeom prst="straightConnector1">
+            <a:avLst/>
+          </a:prstGeom>
+          <a:ln>
+            <a:tailEnd type="triangle"/>
+          </a:ln>
+        </p:spPr>
+        <p:style>
+          <a:lnRef idx="1">
+            <a:schemeClr val="accent1"/>
+          </a:lnRef>
+          <a:fillRef idx="0">
+            <a:schemeClr val="accent1"/>
+          </a:fillRef>
+          <a:effectRef idx="0">
+            <a:schemeClr val="accent1"/>
+          </a:effectRef>
+          <a:fontRef idx="minor">
+            <a:schemeClr val="tx1"/>
+          </a:fontRef>
+        </p:style>
+      </p:cxnSp>
+    </p:spTree>
+    <p:extLst>
+      <p:ext uri="{BB962C8B-B14F-4D97-AF65-F5344CB8AC3E}">
+        <p14:creationId xmlns:p14="http://schemas.microsoft.com/office/powerpoint/2010/main" val="392014652"/>
+      </p:ext>
+    </p:extLst>
+  </p:cSld>
+  <p:clrMapOvr>
+    <a:masterClrMapping/>
+  </p:clrMapOvr>
+</p:sld>
+</file>
+
+<file path=ppt/slides/slide3.xml><?xml version="1.0" encoding="utf-8"?>
 <p:sld xmlns:a="http://schemas.openxmlformats.org/drawingml/2006/main" xmlns:r="http://schemas.openxmlformats.org/officeDocument/2006/relationships" xmlns:p="http://schemas.openxmlformats.org/presentationml/2006/main">
   <p:cSld>
     <p:spTree>
@@ -5983,7 +7258,7 @@
         <p:spPr>
           <a:xfrm>
             <a:off x="301841" y="3497802"/>
-            <a:ext cx="9161755" cy="923330"/>
+            <a:ext cx="9161755" cy="2308324"/>
           </a:xfrm>
           <a:prstGeom prst="rect">
             <a:avLst/>
@@ -5996,12 +7271,13 @@
           </a:bodyPr>
           <a:lstStyle/>
           <a:p>
-            <a:r>
-              <a:rPr lang="nb-NO" dirty="0"/>
-              <a:t>Tid:</a:t>
-            </a:r>
-          </a:p>
-          <a:p>
+            <a:endParaRPr lang="nb-NO" dirty="0"/>
+          </a:p>
+          <a:p>
+            <a:pPr marL="285750" indent="-285750">
+              <a:buFont typeface="Arial" panose="020B0604020202020204" pitchFamily="34" charset="0"/>
+              <a:buChar char="•"/>
+            </a:pPr>
             <a:r>
               <a:rPr lang="nb-NO" dirty="0"/>
               <a:t>Total: </a:t>
@@ -6014,6 +7290,49 @@
               <a:rPr lang="nb-NO" dirty="0"/>
               <a:t> 73 sekunder</a:t>
             </a:r>
+          </a:p>
+          <a:p>
+            <a:pPr marL="285750" indent="-285750">
+              <a:buFont typeface="Arial" panose="020B0604020202020204" pitchFamily="34" charset="0"/>
+              <a:buChar char="•"/>
+            </a:pPr>
+            <a:endParaRPr lang="nb-NO" dirty="0"/>
+          </a:p>
+          <a:p>
+            <a:pPr marL="285750" indent="-285750">
+              <a:buFont typeface="Arial" panose="020B0604020202020204" pitchFamily="34" charset="0"/>
+              <a:buChar char="•"/>
+            </a:pPr>
+            <a:r>
+              <a:rPr lang="nb-NO" dirty="0" err="1"/>
+              <a:t>migration</a:t>
+            </a:r>
+            <a:endParaRPr lang="nb-NO" dirty="0"/>
+          </a:p>
+          <a:p>
+            <a:pPr marL="285750" indent="-285750">
+              <a:buFont typeface="Arial" panose="020B0604020202020204" pitchFamily="34" charset="0"/>
+              <a:buChar char="•"/>
+            </a:pPr>
+            <a:endParaRPr lang="nb-NO" dirty="0"/>
+          </a:p>
+          <a:p>
+            <a:pPr marL="285750" indent="-285750">
+              <a:buFont typeface="Arial" panose="020B0604020202020204" pitchFamily="34" charset="0"/>
+              <a:buChar char="•"/>
+            </a:pPr>
+            <a:r>
+              <a:rPr lang="nb-NO" dirty="0" err="1"/>
+              <a:t>feeding</a:t>
+            </a:r>
+            <a:endParaRPr lang="nb-NO" dirty="0"/>
+          </a:p>
+          <a:p>
+            <a:pPr marL="285750" indent="-285750">
+              <a:buFont typeface="Arial" panose="020B0604020202020204" pitchFamily="34" charset="0"/>
+              <a:buChar char="•"/>
+            </a:pPr>
+            <a:endParaRPr lang="nb-NO" dirty="0"/>
           </a:p>
           <a:p>
             <a:endParaRPr lang="nb-NO" dirty="0"/>
@@ -6033,7 +7352,7 @@
 </p:sld>
 </file>
 
-<file path=ppt/slides/slide3.xml><?xml version="1.0" encoding="utf-8"?>
+<file path=ppt/slides/slide4.xml><?xml version="1.0" encoding="utf-8"?>
 <p:sld xmlns:a="http://schemas.openxmlformats.org/drawingml/2006/main" xmlns:r="http://schemas.openxmlformats.org/officeDocument/2006/relationships" xmlns:p="http://schemas.openxmlformats.org/presentationml/2006/main">
   <p:cSld>
     <p:spTree>
@@ -6095,7 +7414,7 @@
         <p:spPr>
           <a:xfrm>
             <a:off x="408373" y="3710866"/>
-            <a:ext cx="8984202" cy="2031325"/>
+            <a:ext cx="8984202" cy="2585323"/>
           </a:xfrm>
           <a:prstGeom prst="rect">
             <a:avLst/>
@@ -6114,6 +7433,10 @@
             </a:r>
           </a:p>
           <a:p>
+            <a:pPr marL="285750" indent="-285750">
+              <a:buFont typeface="Arial" panose="020B0604020202020204" pitchFamily="34" charset="0"/>
+              <a:buChar char="•"/>
+            </a:pPr>
             <a:r>
               <a:rPr lang="nb-NO" dirty="0" err="1"/>
               <a:t>np.random.choice</a:t>
@@ -6127,6 +7450,10 @@
             <a:endParaRPr lang="nb-NO" dirty="0"/>
           </a:p>
           <a:p>
+            <a:pPr marL="285750" indent="-285750">
+              <a:buFont typeface="Arial" panose="020B0604020202020204" pitchFamily="34" charset="0"/>
+              <a:buChar char="•"/>
+            </a:pPr>
             <a:r>
               <a:rPr lang="nb-NO" dirty="0" err="1"/>
               <a:t>feeding</a:t>
@@ -6148,13 +7475,47 @@
             <a:endParaRPr lang="nb-NO" dirty="0"/>
           </a:p>
           <a:p>
+            <a:pPr marL="285750" indent="-285750">
+              <a:buFont typeface="Arial" panose="020B0604020202020204" pitchFamily="34" charset="0"/>
+              <a:buChar char="•"/>
+            </a:pPr>
             <a:r>
               <a:rPr lang="nb-NO" dirty="0" err="1"/>
               <a:t>update_fitness</a:t>
             </a:r>
             <a:r>
               <a:rPr lang="nb-NO" dirty="0"/>
-              <a:t>: mulighet for optimalisering </a:t>
+              <a:t>: </a:t>
+            </a:r>
+            <a:r>
+              <a:rPr lang="nb-NO" dirty="0" err="1"/>
+              <a:t>jit</a:t>
+            </a:r>
+            <a:r>
+              <a:rPr lang="nb-NO" dirty="0"/>
+              <a:t> og </a:t>
+            </a:r>
+            <a:r>
+              <a:rPr lang="nb-NO" dirty="0" err="1"/>
+              <a:t>lazy</a:t>
+            </a:r>
+            <a:r>
+              <a:rPr lang="nb-NO" dirty="0"/>
+              <a:t> </a:t>
+            </a:r>
+            <a:r>
+              <a:rPr lang="nb-NO" dirty="0" err="1"/>
+              <a:t>evaluation</a:t>
+            </a:r>
+            <a:endParaRPr lang="nb-NO" dirty="0"/>
+          </a:p>
+          <a:p>
+            <a:endParaRPr lang="nb-NO" dirty="0"/>
+          </a:p>
+          <a:p>
+            <a:r>
+              <a:rPr lang="nb-NO" dirty="0"/>
+              <a:t> </a:t>
             </a:r>
           </a:p>
           <a:p>
@@ -6175,1147 +7536,7 @@
 </p:sld>
 </file>
 
-<file path=ppt/slides/slide4.xml><?xml version="1.0" encoding="utf-8"?>
-<p:sld xmlns:a="http://schemas.openxmlformats.org/drawingml/2006/main" xmlns:r="http://schemas.openxmlformats.org/officeDocument/2006/relationships" xmlns:p="http://schemas.openxmlformats.org/presentationml/2006/main">
-  <p:cSld>
-    <p:spTree>
-      <p:nvGrpSpPr>
-        <p:cNvPr id="1" name=""/>
-        <p:cNvGrpSpPr/>
-        <p:nvPr/>
-      </p:nvGrpSpPr>
-      <p:grpSpPr>
-        <a:xfrm>
-          <a:off x="0" y="0"/>
-          <a:ext cx="0" cy="0"/>
-          <a:chOff x="0" y="0"/>
-          <a:chExt cx="0" cy="0"/>
-        </a:xfrm>
-      </p:grpSpPr>
-      <p:sp>
-        <p:nvSpPr>
-          <p:cNvPr id="2" name="TekstSylinder 1">
-            <a:extLst>
-              <a:ext uri="{FF2B5EF4-FFF2-40B4-BE49-F238E27FC236}">
-                <a16:creationId xmlns:a16="http://schemas.microsoft.com/office/drawing/2014/main" id="{D6E4240E-CE1D-4E1D-A80F-8BB86C94CE72}"/>
-              </a:ext>
-            </a:extLst>
-          </p:cNvPr>
-          <p:cNvSpPr txBox="1"/>
-          <p:nvPr/>
-        </p:nvSpPr>
-        <p:spPr>
-          <a:xfrm>
-            <a:off x="4083728" y="266330"/>
-            <a:ext cx="2308194" cy="369332"/>
-          </a:xfrm>
-          <a:prstGeom prst="rect">
-            <a:avLst/>
-          </a:prstGeom>
-          <a:noFill/>
-        </p:spPr>
-        <p:txBody>
-          <a:bodyPr wrap="square" rtlCol="0">
-            <a:spAutoFit/>
-          </a:bodyPr>
-          <a:lstStyle/>
-          <a:p>
-            <a:pPr algn="ctr"/>
-            <a:r>
-              <a:rPr lang="nb-NO" dirty="0" err="1"/>
-              <a:t>BioSim</a:t>
-            </a:r>
-            <a:endParaRPr lang="nb-NO" dirty="0"/>
-          </a:p>
-        </p:txBody>
-      </p:sp>
-      <p:sp>
-        <p:nvSpPr>
-          <p:cNvPr id="3" name="TekstSylinder 2">
-            <a:extLst>
-              <a:ext uri="{FF2B5EF4-FFF2-40B4-BE49-F238E27FC236}">
-                <a16:creationId xmlns:a16="http://schemas.microsoft.com/office/drawing/2014/main" id="{8CFC9723-D149-4897-9D86-841E13928976}"/>
-              </a:ext>
-            </a:extLst>
-          </p:cNvPr>
-          <p:cNvSpPr txBox="1"/>
-          <p:nvPr/>
-        </p:nvSpPr>
-        <p:spPr>
-          <a:xfrm>
-            <a:off x="1606858" y="1145219"/>
-            <a:ext cx="1953088" cy="369332"/>
-          </a:xfrm>
-          <a:prstGeom prst="rect">
-            <a:avLst/>
-          </a:prstGeom>
-          <a:noFill/>
-        </p:spPr>
-        <p:txBody>
-          <a:bodyPr wrap="square" rtlCol="0">
-            <a:spAutoFit/>
-          </a:bodyPr>
-          <a:lstStyle/>
-          <a:p>
-            <a:pPr algn="ctr"/>
-            <a:r>
-              <a:rPr lang="nb-NO" dirty="0"/>
-              <a:t>Island</a:t>
-            </a:r>
-          </a:p>
-        </p:txBody>
-      </p:sp>
-      <p:sp>
-        <p:nvSpPr>
-          <p:cNvPr id="4" name="TekstSylinder 3">
-            <a:extLst>
-              <a:ext uri="{FF2B5EF4-FFF2-40B4-BE49-F238E27FC236}">
-                <a16:creationId xmlns:a16="http://schemas.microsoft.com/office/drawing/2014/main" id="{03D37941-03BB-4D2A-A6D2-9E20681D4A28}"/>
-              </a:ext>
-            </a:extLst>
-          </p:cNvPr>
-          <p:cNvSpPr txBox="1"/>
-          <p:nvPr/>
-        </p:nvSpPr>
-        <p:spPr>
-          <a:xfrm>
-            <a:off x="6684883" y="1145219"/>
-            <a:ext cx="1935332" cy="369332"/>
-          </a:xfrm>
-          <a:prstGeom prst="rect">
-            <a:avLst/>
-          </a:prstGeom>
-          <a:noFill/>
-        </p:spPr>
-        <p:txBody>
-          <a:bodyPr wrap="square" rtlCol="0">
-            <a:spAutoFit/>
-          </a:bodyPr>
-          <a:lstStyle/>
-          <a:p>
-            <a:pPr algn="ctr"/>
-            <a:r>
-              <a:rPr lang="nb-NO" dirty="0"/>
-              <a:t>Simulering</a:t>
-            </a:r>
-          </a:p>
-        </p:txBody>
-      </p:sp>
-      <p:sp>
-        <p:nvSpPr>
-          <p:cNvPr id="5" name="TekstSylinder 4">
-            <a:extLst>
-              <a:ext uri="{FF2B5EF4-FFF2-40B4-BE49-F238E27FC236}">
-                <a16:creationId xmlns:a16="http://schemas.microsoft.com/office/drawing/2014/main" id="{69DC1C5E-F647-453E-B635-C4D625CFB549}"/>
-              </a:ext>
-            </a:extLst>
-          </p:cNvPr>
-          <p:cNvSpPr txBox="1"/>
-          <p:nvPr/>
-        </p:nvSpPr>
-        <p:spPr>
-          <a:xfrm>
-            <a:off x="1651246" y="2263806"/>
-            <a:ext cx="1864311" cy="369332"/>
-          </a:xfrm>
-          <a:prstGeom prst="rect">
-            <a:avLst/>
-          </a:prstGeom>
-          <a:noFill/>
-        </p:spPr>
-        <p:txBody>
-          <a:bodyPr wrap="square" rtlCol="0">
-            <a:spAutoFit/>
-          </a:bodyPr>
-          <a:lstStyle/>
-          <a:p>
-            <a:pPr algn="ctr"/>
-            <a:r>
-              <a:rPr lang="nb-NO" dirty="0"/>
-              <a:t>Landscapes</a:t>
-            </a:r>
-          </a:p>
-        </p:txBody>
-      </p:sp>
-      <p:sp>
-        <p:nvSpPr>
-          <p:cNvPr id="7" name="TekstSylinder 6">
-            <a:extLst>
-              <a:ext uri="{FF2B5EF4-FFF2-40B4-BE49-F238E27FC236}">
-                <a16:creationId xmlns:a16="http://schemas.microsoft.com/office/drawing/2014/main" id="{21253703-21E8-4AE1-8005-E773748993D5}"/>
-              </a:ext>
-            </a:extLst>
-          </p:cNvPr>
-          <p:cNvSpPr txBox="1"/>
-          <p:nvPr/>
-        </p:nvSpPr>
-        <p:spPr>
-          <a:xfrm>
-            <a:off x="1788849" y="4563123"/>
-            <a:ext cx="1589103" cy="381740"/>
-          </a:xfrm>
-          <a:prstGeom prst="rect">
-            <a:avLst/>
-          </a:prstGeom>
-          <a:noFill/>
-        </p:spPr>
-        <p:txBody>
-          <a:bodyPr wrap="square" rtlCol="0">
-            <a:spAutoFit/>
-          </a:bodyPr>
-          <a:lstStyle/>
-          <a:p>
-            <a:pPr algn="ctr"/>
-            <a:r>
-              <a:rPr lang="nb-NO" dirty="0" err="1"/>
-              <a:t>Animals</a:t>
-            </a:r>
-            <a:endParaRPr lang="nb-NO" dirty="0"/>
-          </a:p>
-        </p:txBody>
-      </p:sp>
-      <p:sp>
-        <p:nvSpPr>
-          <p:cNvPr id="10" name="TekstSylinder 9">
-            <a:extLst>
-              <a:ext uri="{FF2B5EF4-FFF2-40B4-BE49-F238E27FC236}">
-                <a16:creationId xmlns:a16="http://schemas.microsoft.com/office/drawing/2014/main" id="{D68A99DC-E29F-4361-A516-695C15AD645B}"/>
-              </a:ext>
-            </a:extLst>
-          </p:cNvPr>
-          <p:cNvSpPr txBox="1"/>
-          <p:nvPr/>
-        </p:nvSpPr>
-        <p:spPr>
-          <a:xfrm>
-            <a:off x="4591973" y="2621587"/>
-            <a:ext cx="1615735" cy="381739"/>
-          </a:xfrm>
-          <a:prstGeom prst="rect">
-            <a:avLst/>
-          </a:prstGeom>
-          <a:noFill/>
-        </p:spPr>
-        <p:txBody>
-          <a:bodyPr wrap="square" rtlCol="0">
-            <a:spAutoFit/>
-          </a:bodyPr>
-          <a:lstStyle/>
-          <a:p>
-            <a:pPr algn="ctr"/>
-            <a:r>
-              <a:rPr lang="nb-NO" dirty="0" err="1"/>
-              <a:t>Jungle</a:t>
-            </a:r>
-            <a:endParaRPr lang="nb-NO" dirty="0"/>
-          </a:p>
-        </p:txBody>
-      </p:sp>
-      <p:sp>
-        <p:nvSpPr>
-          <p:cNvPr id="11" name="TekstSylinder 10">
-            <a:extLst>
-              <a:ext uri="{FF2B5EF4-FFF2-40B4-BE49-F238E27FC236}">
-                <a16:creationId xmlns:a16="http://schemas.microsoft.com/office/drawing/2014/main" id="{C77D06B7-7FE1-4A6C-85E2-5F8D56BAB253}"/>
-              </a:ext>
-            </a:extLst>
-          </p:cNvPr>
-          <p:cNvSpPr txBox="1"/>
-          <p:nvPr/>
-        </p:nvSpPr>
-        <p:spPr>
-          <a:xfrm>
-            <a:off x="4244637" y="3393493"/>
-            <a:ext cx="1233996" cy="369332"/>
-          </a:xfrm>
-          <a:prstGeom prst="rect">
-            <a:avLst/>
-          </a:prstGeom>
-          <a:noFill/>
-        </p:spPr>
-        <p:txBody>
-          <a:bodyPr wrap="square" rtlCol="0">
-            <a:spAutoFit/>
-          </a:bodyPr>
-          <a:lstStyle/>
-          <a:p>
-            <a:r>
-              <a:rPr lang="nb-NO" dirty="0"/>
-              <a:t>Savannah</a:t>
-            </a:r>
-          </a:p>
-        </p:txBody>
-      </p:sp>
-      <p:sp>
-        <p:nvSpPr>
-          <p:cNvPr id="12" name="TekstSylinder 11">
-            <a:extLst>
-              <a:ext uri="{FF2B5EF4-FFF2-40B4-BE49-F238E27FC236}">
-                <a16:creationId xmlns:a16="http://schemas.microsoft.com/office/drawing/2014/main" id="{18F47B8A-844C-463A-815D-8A91AEF26FDC}"/>
-              </a:ext>
-            </a:extLst>
-          </p:cNvPr>
-          <p:cNvSpPr txBox="1"/>
-          <p:nvPr/>
-        </p:nvSpPr>
-        <p:spPr>
-          <a:xfrm>
-            <a:off x="5566300" y="3386029"/>
-            <a:ext cx="1083075" cy="369332"/>
-          </a:xfrm>
-          <a:prstGeom prst="rect">
-            <a:avLst/>
-          </a:prstGeom>
-          <a:noFill/>
-        </p:spPr>
-        <p:txBody>
-          <a:bodyPr wrap="square" rtlCol="0">
-            <a:spAutoFit/>
-          </a:bodyPr>
-          <a:lstStyle/>
-          <a:p>
-            <a:pPr algn="ctr"/>
-            <a:r>
-              <a:rPr lang="nb-NO" dirty="0" err="1"/>
-              <a:t>Desert</a:t>
-            </a:r>
-            <a:endParaRPr lang="nb-NO" dirty="0"/>
-          </a:p>
-        </p:txBody>
-      </p:sp>
-      <p:sp>
-        <p:nvSpPr>
-          <p:cNvPr id="13" name="TekstSylinder 12">
-            <a:extLst>
-              <a:ext uri="{FF2B5EF4-FFF2-40B4-BE49-F238E27FC236}">
-                <a16:creationId xmlns:a16="http://schemas.microsoft.com/office/drawing/2014/main" id="{0FF243F6-F2C9-4AE8-9872-09B6E3F6F88F}"/>
-              </a:ext>
-            </a:extLst>
-          </p:cNvPr>
-          <p:cNvSpPr txBox="1"/>
-          <p:nvPr/>
-        </p:nvSpPr>
-        <p:spPr>
-          <a:xfrm>
-            <a:off x="2805343" y="3012204"/>
-            <a:ext cx="1420427" cy="369332"/>
-          </a:xfrm>
-          <a:prstGeom prst="rect">
-            <a:avLst/>
-          </a:prstGeom>
-          <a:noFill/>
-        </p:spPr>
-        <p:txBody>
-          <a:bodyPr wrap="square" rtlCol="0">
-            <a:spAutoFit/>
-          </a:bodyPr>
-          <a:lstStyle/>
-          <a:p>
-            <a:pPr algn="ctr"/>
-            <a:r>
-              <a:rPr lang="nb-NO" dirty="0" err="1"/>
-              <a:t>Mountain</a:t>
-            </a:r>
-            <a:endParaRPr lang="nb-NO" dirty="0"/>
-          </a:p>
-        </p:txBody>
-      </p:sp>
-      <p:sp>
-        <p:nvSpPr>
-          <p:cNvPr id="14" name="TekstSylinder 13">
-            <a:extLst>
-              <a:ext uri="{FF2B5EF4-FFF2-40B4-BE49-F238E27FC236}">
-                <a16:creationId xmlns:a16="http://schemas.microsoft.com/office/drawing/2014/main" id="{F61EF8E1-C83D-423B-BF35-0644375ECF1B}"/>
-              </a:ext>
-            </a:extLst>
-          </p:cNvPr>
-          <p:cNvSpPr txBox="1"/>
-          <p:nvPr/>
-        </p:nvSpPr>
-        <p:spPr>
-          <a:xfrm>
-            <a:off x="1282821" y="3026428"/>
-            <a:ext cx="1189607" cy="369332"/>
-          </a:xfrm>
-          <a:prstGeom prst="rect">
-            <a:avLst/>
-          </a:prstGeom>
-          <a:noFill/>
-        </p:spPr>
-        <p:txBody>
-          <a:bodyPr wrap="square" rtlCol="0">
-            <a:spAutoFit/>
-          </a:bodyPr>
-          <a:lstStyle/>
-          <a:p>
-            <a:r>
-              <a:rPr lang="nb-NO" dirty="0"/>
-              <a:t>Ocean</a:t>
-            </a:r>
-          </a:p>
-        </p:txBody>
-      </p:sp>
-      <p:sp>
-        <p:nvSpPr>
-          <p:cNvPr id="15" name="TekstSylinder 14">
-            <a:extLst>
-              <a:ext uri="{FF2B5EF4-FFF2-40B4-BE49-F238E27FC236}">
-                <a16:creationId xmlns:a16="http://schemas.microsoft.com/office/drawing/2014/main" id="{0CF3EBBF-593D-444D-80D9-0A6D8E15FE14}"/>
-              </a:ext>
-            </a:extLst>
-          </p:cNvPr>
-          <p:cNvSpPr txBox="1"/>
-          <p:nvPr/>
-        </p:nvSpPr>
-        <p:spPr>
-          <a:xfrm>
-            <a:off x="4636361" y="5059470"/>
-            <a:ext cx="1571347" cy="369332"/>
-          </a:xfrm>
-          <a:prstGeom prst="rect">
-            <a:avLst/>
-          </a:prstGeom>
-          <a:noFill/>
-        </p:spPr>
-        <p:txBody>
-          <a:bodyPr wrap="square" rtlCol="0">
-            <a:spAutoFit/>
-          </a:bodyPr>
-          <a:lstStyle/>
-          <a:p>
-            <a:pPr algn="ctr"/>
-            <a:r>
-              <a:rPr lang="nb-NO" dirty="0"/>
-              <a:t>Herbivores</a:t>
-            </a:r>
-          </a:p>
-        </p:txBody>
-      </p:sp>
-      <p:sp>
-        <p:nvSpPr>
-          <p:cNvPr id="16" name="TekstSylinder 15">
-            <a:extLst>
-              <a:ext uri="{FF2B5EF4-FFF2-40B4-BE49-F238E27FC236}">
-                <a16:creationId xmlns:a16="http://schemas.microsoft.com/office/drawing/2014/main" id="{7A7CEC24-D009-4935-BD9D-CC6D92882EF7}"/>
-              </a:ext>
-            </a:extLst>
-          </p:cNvPr>
-          <p:cNvSpPr txBox="1"/>
-          <p:nvPr/>
-        </p:nvSpPr>
-        <p:spPr>
-          <a:xfrm>
-            <a:off x="4543144" y="5978364"/>
-            <a:ext cx="1757779" cy="369332"/>
-          </a:xfrm>
-          <a:prstGeom prst="rect">
-            <a:avLst/>
-          </a:prstGeom>
-          <a:noFill/>
-        </p:spPr>
-        <p:txBody>
-          <a:bodyPr wrap="square" rtlCol="0">
-            <a:spAutoFit/>
-          </a:bodyPr>
-          <a:lstStyle/>
-          <a:p>
-            <a:pPr algn="ctr"/>
-            <a:r>
-              <a:rPr lang="nb-NO" dirty="0" err="1"/>
-              <a:t>Carnivores</a:t>
-            </a:r>
-            <a:endParaRPr lang="nb-NO" dirty="0"/>
-          </a:p>
-        </p:txBody>
-      </p:sp>
-      <p:cxnSp>
-        <p:nvCxnSpPr>
-          <p:cNvPr id="18" name="Rett pilkobling 17">
-            <a:extLst>
-              <a:ext uri="{FF2B5EF4-FFF2-40B4-BE49-F238E27FC236}">
-                <a16:creationId xmlns:a16="http://schemas.microsoft.com/office/drawing/2014/main" id="{31898799-E63F-49C4-A366-2C864DA8A1F0}"/>
-              </a:ext>
-            </a:extLst>
-          </p:cNvPr>
-          <p:cNvCxnSpPr>
-            <a:stCxn id="2" idx="2"/>
-            <a:endCxn id="3" idx="0"/>
-          </p:cNvCxnSpPr>
-          <p:nvPr/>
-        </p:nvCxnSpPr>
-        <p:spPr>
-          <a:xfrm flipH="1">
-            <a:off x="2583402" y="635662"/>
-            <a:ext cx="2654423" cy="509557"/>
-          </a:xfrm>
-          <a:prstGeom prst="straightConnector1">
-            <a:avLst/>
-          </a:prstGeom>
-          <a:ln>
-            <a:tailEnd type="triangle"/>
-          </a:ln>
-        </p:spPr>
-        <p:style>
-          <a:lnRef idx="1">
-            <a:schemeClr val="accent1"/>
-          </a:lnRef>
-          <a:fillRef idx="0">
-            <a:schemeClr val="accent1"/>
-          </a:fillRef>
-          <a:effectRef idx="0">
-            <a:schemeClr val="accent1"/>
-          </a:effectRef>
-          <a:fontRef idx="minor">
-            <a:schemeClr val="tx1"/>
-          </a:fontRef>
-        </p:style>
-      </p:cxnSp>
-      <p:cxnSp>
-        <p:nvCxnSpPr>
-          <p:cNvPr id="20" name="Rett pilkobling 19">
-            <a:extLst>
-              <a:ext uri="{FF2B5EF4-FFF2-40B4-BE49-F238E27FC236}">
-                <a16:creationId xmlns:a16="http://schemas.microsoft.com/office/drawing/2014/main" id="{82D0E1F6-1040-4CDD-9482-D935ED7B389F}"/>
-              </a:ext>
-            </a:extLst>
-          </p:cNvPr>
-          <p:cNvCxnSpPr>
-            <a:stCxn id="2" idx="2"/>
-            <a:endCxn id="4" idx="0"/>
-          </p:cNvCxnSpPr>
-          <p:nvPr/>
-        </p:nvCxnSpPr>
-        <p:spPr>
-          <a:xfrm>
-            <a:off x="5237825" y="635662"/>
-            <a:ext cx="2414724" cy="509557"/>
-          </a:xfrm>
-          <a:prstGeom prst="straightConnector1">
-            <a:avLst/>
-          </a:prstGeom>
-          <a:ln>
-            <a:tailEnd type="triangle"/>
-          </a:ln>
-        </p:spPr>
-        <p:style>
-          <a:lnRef idx="1">
-            <a:schemeClr val="accent1"/>
-          </a:lnRef>
-          <a:fillRef idx="0">
-            <a:schemeClr val="accent1"/>
-          </a:fillRef>
-          <a:effectRef idx="0">
-            <a:schemeClr val="accent1"/>
-          </a:effectRef>
-          <a:fontRef idx="minor">
-            <a:schemeClr val="tx1"/>
-          </a:fontRef>
-        </p:style>
-      </p:cxnSp>
-      <p:cxnSp>
-        <p:nvCxnSpPr>
-          <p:cNvPr id="22" name="Rett pilkobling 21">
-            <a:extLst>
-              <a:ext uri="{FF2B5EF4-FFF2-40B4-BE49-F238E27FC236}">
-                <a16:creationId xmlns:a16="http://schemas.microsoft.com/office/drawing/2014/main" id="{8F8C6D0B-A05B-427F-B960-B9FD4C0C81DC}"/>
-              </a:ext>
-            </a:extLst>
-          </p:cNvPr>
-          <p:cNvCxnSpPr>
-            <a:stCxn id="5" idx="3"/>
-            <a:endCxn id="10" idx="0"/>
-          </p:cNvCxnSpPr>
-          <p:nvPr/>
-        </p:nvCxnSpPr>
-        <p:spPr>
-          <a:xfrm>
-            <a:off x="3515557" y="2448472"/>
-            <a:ext cx="1884284" cy="173115"/>
-          </a:xfrm>
-          <a:prstGeom prst="straightConnector1">
-            <a:avLst/>
-          </a:prstGeom>
-          <a:ln>
-            <a:tailEnd type="triangle"/>
-          </a:ln>
-        </p:spPr>
-        <p:style>
-          <a:lnRef idx="1">
-            <a:schemeClr val="accent1"/>
-          </a:lnRef>
-          <a:fillRef idx="0">
-            <a:schemeClr val="accent1"/>
-          </a:fillRef>
-          <a:effectRef idx="0">
-            <a:schemeClr val="accent1"/>
-          </a:effectRef>
-          <a:fontRef idx="minor">
-            <a:schemeClr val="tx1"/>
-          </a:fontRef>
-        </p:style>
-      </p:cxnSp>
-      <p:cxnSp>
-        <p:nvCxnSpPr>
-          <p:cNvPr id="24" name="Rett pilkobling 23">
-            <a:extLst>
-              <a:ext uri="{FF2B5EF4-FFF2-40B4-BE49-F238E27FC236}">
-                <a16:creationId xmlns:a16="http://schemas.microsoft.com/office/drawing/2014/main" id="{CADF50D9-BA52-442C-837C-8668A1E0E6D5}"/>
-              </a:ext>
-            </a:extLst>
-          </p:cNvPr>
-          <p:cNvCxnSpPr>
-            <a:stCxn id="10" idx="2"/>
-            <a:endCxn id="11" idx="0"/>
-          </p:cNvCxnSpPr>
-          <p:nvPr/>
-        </p:nvCxnSpPr>
-        <p:spPr>
-          <a:xfrm flipH="1">
-            <a:off x="4861635" y="3003326"/>
-            <a:ext cx="538206" cy="390167"/>
-          </a:xfrm>
-          <a:prstGeom prst="straightConnector1">
-            <a:avLst/>
-          </a:prstGeom>
-          <a:ln>
-            <a:tailEnd type="triangle"/>
-          </a:ln>
-        </p:spPr>
-        <p:style>
-          <a:lnRef idx="1">
-            <a:schemeClr val="accent1"/>
-          </a:lnRef>
-          <a:fillRef idx="0">
-            <a:schemeClr val="accent1"/>
-          </a:fillRef>
-          <a:effectRef idx="0">
-            <a:schemeClr val="accent1"/>
-          </a:effectRef>
-          <a:fontRef idx="minor">
-            <a:schemeClr val="tx1"/>
-          </a:fontRef>
-        </p:style>
-      </p:cxnSp>
-      <p:cxnSp>
-        <p:nvCxnSpPr>
-          <p:cNvPr id="26" name="Rett pilkobling 25">
-            <a:extLst>
-              <a:ext uri="{FF2B5EF4-FFF2-40B4-BE49-F238E27FC236}">
-                <a16:creationId xmlns:a16="http://schemas.microsoft.com/office/drawing/2014/main" id="{5AFAD022-DAF1-432B-86D2-F75F06F3262E}"/>
-              </a:ext>
-            </a:extLst>
-          </p:cNvPr>
-          <p:cNvCxnSpPr>
-            <a:stCxn id="10" idx="2"/>
-            <a:endCxn id="12" idx="0"/>
-          </p:cNvCxnSpPr>
-          <p:nvPr/>
-        </p:nvCxnSpPr>
-        <p:spPr>
-          <a:xfrm>
-            <a:off x="5399841" y="3003326"/>
-            <a:ext cx="707997" cy="382703"/>
-          </a:xfrm>
-          <a:prstGeom prst="straightConnector1">
-            <a:avLst/>
-          </a:prstGeom>
-          <a:ln>
-            <a:tailEnd type="triangle"/>
-          </a:ln>
-        </p:spPr>
-        <p:style>
-          <a:lnRef idx="1">
-            <a:schemeClr val="accent1"/>
-          </a:lnRef>
-          <a:fillRef idx="0">
-            <a:schemeClr val="accent1"/>
-          </a:fillRef>
-          <a:effectRef idx="0">
-            <a:schemeClr val="accent1"/>
-          </a:effectRef>
-          <a:fontRef idx="minor">
-            <a:schemeClr val="tx1"/>
-          </a:fontRef>
-        </p:style>
-      </p:cxnSp>
-      <p:cxnSp>
-        <p:nvCxnSpPr>
-          <p:cNvPr id="28" name="Rett pilkobling 27">
-            <a:extLst>
-              <a:ext uri="{FF2B5EF4-FFF2-40B4-BE49-F238E27FC236}">
-                <a16:creationId xmlns:a16="http://schemas.microsoft.com/office/drawing/2014/main" id="{AE24E4CB-12A3-480B-82C5-A6ABD50460C9}"/>
-              </a:ext>
-            </a:extLst>
-          </p:cNvPr>
-          <p:cNvCxnSpPr>
-            <a:stCxn id="5" idx="2"/>
-            <a:endCxn id="14" idx="0"/>
-          </p:cNvCxnSpPr>
-          <p:nvPr/>
-        </p:nvCxnSpPr>
-        <p:spPr>
-          <a:xfrm flipH="1">
-            <a:off x="1877625" y="2633138"/>
-            <a:ext cx="705777" cy="393290"/>
-          </a:xfrm>
-          <a:prstGeom prst="straightConnector1">
-            <a:avLst/>
-          </a:prstGeom>
-          <a:ln>
-            <a:tailEnd type="triangle"/>
-          </a:ln>
-        </p:spPr>
-        <p:style>
-          <a:lnRef idx="1">
-            <a:schemeClr val="accent1"/>
-          </a:lnRef>
-          <a:fillRef idx="0">
-            <a:schemeClr val="accent1"/>
-          </a:fillRef>
-          <a:effectRef idx="0">
-            <a:schemeClr val="accent1"/>
-          </a:effectRef>
-          <a:fontRef idx="minor">
-            <a:schemeClr val="tx1"/>
-          </a:fontRef>
-        </p:style>
-      </p:cxnSp>
-      <p:cxnSp>
-        <p:nvCxnSpPr>
-          <p:cNvPr id="30" name="Rett pilkobling 29">
-            <a:extLst>
-              <a:ext uri="{FF2B5EF4-FFF2-40B4-BE49-F238E27FC236}">
-                <a16:creationId xmlns:a16="http://schemas.microsoft.com/office/drawing/2014/main" id="{D0E70AB2-B168-48F3-A2E7-6CEB31803BE8}"/>
-              </a:ext>
-            </a:extLst>
-          </p:cNvPr>
-          <p:cNvCxnSpPr>
-            <a:stCxn id="5" idx="2"/>
-            <a:endCxn id="13" idx="0"/>
-          </p:cNvCxnSpPr>
-          <p:nvPr/>
-        </p:nvCxnSpPr>
-        <p:spPr>
-          <a:xfrm>
-            <a:off x="2583402" y="2633138"/>
-            <a:ext cx="932155" cy="379066"/>
-          </a:xfrm>
-          <a:prstGeom prst="straightConnector1">
-            <a:avLst/>
-          </a:prstGeom>
-          <a:ln>
-            <a:tailEnd type="triangle"/>
-          </a:ln>
-        </p:spPr>
-        <p:style>
-          <a:lnRef idx="1">
-            <a:schemeClr val="accent1"/>
-          </a:lnRef>
-          <a:fillRef idx="0">
-            <a:schemeClr val="accent1"/>
-          </a:fillRef>
-          <a:effectRef idx="0">
-            <a:schemeClr val="accent1"/>
-          </a:effectRef>
-          <a:fontRef idx="minor">
-            <a:schemeClr val="tx1"/>
-          </a:fontRef>
-        </p:style>
-      </p:cxnSp>
-      <p:cxnSp>
-        <p:nvCxnSpPr>
-          <p:cNvPr id="33" name="Rett pilkobling 32">
-            <a:extLst>
-              <a:ext uri="{FF2B5EF4-FFF2-40B4-BE49-F238E27FC236}">
-                <a16:creationId xmlns:a16="http://schemas.microsoft.com/office/drawing/2014/main" id="{B3A8AF10-E6E3-45B6-A92B-F5B598A1B08B}"/>
-              </a:ext>
-            </a:extLst>
-          </p:cNvPr>
-          <p:cNvCxnSpPr>
-            <a:stCxn id="5" idx="2"/>
-            <a:endCxn id="7" idx="0"/>
-          </p:cNvCxnSpPr>
-          <p:nvPr/>
-        </p:nvCxnSpPr>
-        <p:spPr>
-          <a:xfrm flipH="1">
-            <a:off x="2583401" y="2633138"/>
-            <a:ext cx="1" cy="1929985"/>
-          </a:xfrm>
-          <a:prstGeom prst="straightConnector1">
-            <a:avLst/>
-          </a:prstGeom>
-          <a:ln>
-            <a:tailEnd type="triangle"/>
-          </a:ln>
-        </p:spPr>
-        <p:style>
-          <a:lnRef idx="1">
-            <a:schemeClr val="accent1"/>
-          </a:lnRef>
-          <a:fillRef idx="0">
-            <a:schemeClr val="accent1"/>
-          </a:fillRef>
-          <a:effectRef idx="0">
-            <a:schemeClr val="accent1"/>
-          </a:effectRef>
-          <a:fontRef idx="minor">
-            <a:schemeClr val="tx1"/>
-          </a:fontRef>
-        </p:style>
-      </p:cxnSp>
-      <p:cxnSp>
-        <p:nvCxnSpPr>
-          <p:cNvPr id="35" name="Rett pilkobling 34">
-            <a:extLst>
-              <a:ext uri="{FF2B5EF4-FFF2-40B4-BE49-F238E27FC236}">
-                <a16:creationId xmlns:a16="http://schemas.microsoft.com/office/drawing/2014/main" id="{5D1D9C24-21B1-4903-ACD9-E3AB7EA473A6}"/>
-              </a:ext>
-            </a:extLst>
-          </p:cNvPr>
-          <p:cNvCxnSpPr>
-            <a:cxnSpLocks/>
-            <a:stCxn id="7" idx="3"/>
-            <a:endCxn id="15" idx="0"/>
-          </p:cNvCxnSpPr>
-          <p:nvPr/>
-        </p:nvCxnSpPr>
-        <p:spPr>
-          <a:xfrm>
-            <a:off x="3377952" y="4753993"/>
-            <a:ext cx="2044083" cy="305477"/>
-          </a:xfrm>
-          <a:prstGeom prst="straightConnector1">
-            <a:avLst/>
-          </a:prstGeom>
-          <a:ln>
-            <a:tailEnd type="triangle"/>
-          </a:ln>
-        </p:spPr>
-        <p:style>
-          <a:lnRef idx="1">
-            <a:schemeClr val="accent1"/>
-          </a:lnRef>
-          <a:fillRef idx="0">
-            <a:schemeClr val="accent1"/>
-          </a:fillRef>
-          <a:effectRef idx="0">
-            <a:schemeClr val="accent1"/>
-          </a:effectRef>
-          <a:fontRef idx="minor">
-            <a:schemeClr val="tx1"/>
-          </a:fontRef>
-        </p:style>
-      </p:cxnSp>
-      <p:cxnSp>
-        <p:nvCxnSpPr>
-          <p:cNvPr id="37" name="Rett pilkobling 36">
-            <a:extLst>
-              <a:ext uri="{FF2B5EF4-FFF2-40B4-BE49-F238E27FC236}">
-                <a16:creationId xmlns:a16="http://schemas.microsoft.com/office/drawing/2014/main" id="{7899A379-2969-44B5-A5D6-C714820E6392}"/>
-              </a:ext>
-            </a:extLst>
-          </p:cNvPr>
-          <p:cNvCxnSpPr>
-            <a:stCxn id="15" idx="2"/>
-            <a:endCxn id="16" idx="0"/>
-          </p:cNvCxnSpPr>
-          <p:nvPr/>
-        </p:nvCxnSpPr>
-        <p:spPr>
-          <a:xfrm flipH="1">
-            <a:off x="5422034" y="5428802"/>
-            <a:ext cx="1" cy="549562"/>
-          </a:xfrm>
-          <a:prstGeom prst="straightConnector1">
-            <a:avLst/>
-          </a:prstGeom>
-          <a:ln>
-            <a:tailEnd type="triangle"/>
-          </a:ln>
-        </p:spPr>
-        <p:style>
-          <a:lnRef idx="1">
-            <a:schemeClr val="accent1"/>
-          </a:lnRef>
-          <a:fillRef idx="0">
-            <a:schemeClr val="accent1"/>
-          </a:fillRef>
-          <a:effectRef idx="0">
-            <a:schemeClr val="accent1"/>
-          </a:effectRef>
-          <a:fontRef idx="minor">
-            <a:schemeClr val="tx1"/>
-          </a:fontRef>
-        </p:style>
-      </p:cxnSp>
-      <p:cxnSp>
-        <p:nvCxnSpPr>
-          <p:cNvPr id="40" name="Rett pilkobling 39">
-            <a:extLst>
-              <a:ext uri="{FF2B5EF4-FFF2-40B4-BE49-F238E27FC236}">
-                <a16:creationId xmlns:a16="http://schemas.microsoft.com/office/drawing/2014/main" id="{0C12DB73-56F0-4CF6-8C01-80C5B7E6AFCD}"/>
-              </a:ext>
-            </a:extLst>
-          </p:cNvPr>
-          <p:cNvCxnSpPr>
-            <a:stCxn id="3" idx="2"/>
-            <a:endCxn id="5" idx="0"/>
-          </p:cNvCxnSpPr>
-          <p:nvPr/>
-        </p:nvCxnSpPr>
-        <p:spPr>
-          <a:xfrm>
-            <a:off x="2583402" y="1514551"/>
-            <a:ext cx="0" cy="749255"/>
-          </a:xfrm>
-          <a:prstGeom prst="straightConnector1">
-            <a:avLst/>
-          </a:prstGeom>
-          <a:ln>
-            <a:tailEnd type="triangle"/>
-          </a:ln>
-        </p:spPr>
-        <p:style>
-          <a:lnRef idx="1">
-            <a:schemeClr val="accent1"/>
-          </a:lnRef>
-          <a:fillRef idx="0">
-            <a:schemeClr val="accent1"/>
-          </a:fillRef>
-          <a:effectRef idx="0">
-            <a:schemeClr val="accent1"/>
-          </a:effectRef>
-          <a:fontRef idx="minor">
-            <a:schemeClr val="tx1"/>
-          </a:fontRef>
-        </p:style>
-      </p:cxnSp>
-      <p:sp>
-        <p:nvSpPr>
-          <p:cNvPr id="41" name="TekstSylinder 40">
-            <a:extLst>
-              <a:ext uri="{FF2B5EF4-FFF2-40B4-BE49-F238E27FC236}">
-                <a16:creationId xmlns:a16="http://schemas.microsoft.com/office/drawing/2014/main" id="{6C51A316-2551-49AB-92BA-7415F662E613}"/>
-              </a:ext>
-            </a:extLst>
-          </p:cNvPr>
-          <p:cNvSpPr txBox="1"/>
-          <p:nvPr/>
-        </p:nvSpPr>
-        <p:spPr>
-          <a:xfrm>
-            <a:off x="4390007" y="1156290"/>
-            <a:ext cx="1695635" cy="369332"/>
-          </a:xfrm>
-          <a:prstGeom prst="rect">
-            <a:avLst/>
-          </a:prstGeom>
-          <a:noFill/>
-        </p:spPr>
-        <p:txBody>
-          <a:bodyPr wrap="square" rtlCol="0">
-            <a:spAutoFit/>
-          </a:bodyPr>
-          <a:lstStyle/>
-          <a:p>
-            <a:pPr algn="ctr"/>
-            <a:r>
-              <a:rPr lang="nb-NO" dirty="0"/>
-              <a:t>Visualisering</a:t>
-            </a:r>
-          </a:p>
-        </p:txBody>
-      </p:sp>
-      <p:cxnSp>
-        <p:nvCxnSpPr>
-          <p:cNvPr id="44" name="Rett pilkobling 43">
-            <a:extLst>
-              <a:ext uri="{FF2B5EF4-FFF2-40B4-BE49-F238E27FC236}">
-                <a16:creationId xmlns:a16="http://schemas.microsoft.com/office/drawing/2014/main" id="{1D7B7BF3-7F1E-4764-B65F-FF10AD792A32}"/>
-              </a:ext>
-            </a:extLst>
-          </p:cNvPr>
-          <p:cNvCxnSpPr>
-            <a:stCxn id="2" idx="2"/>
-            <a:endCxn id="41" idx="0"/>
-          </p:cNvCxnSpPr>
-          <p:nvPr/>
-        </p:nvCxnSpPr>
-        <p:spPr>
-          <a:xfrm>
-            <a:off x="5237825" y="635662"/>
-            <a:ext cx="0" cy="520628"/>
-          </a:xfrm>
-          <a:prstGeom prst="straightConnector1">
-            <a:avLst/>
-          </a:prstGeom>
-          <a:ln>
-            <a:tailEnd type="triangle"/>
-          </a:ln>
-        </p:spPr>
-        <p:style>
-          <a:lnRef idx="1">
-            <a:schemeClr val="accent1"/>
-          </a:lnRef>
-          <a:fillRef idx="0">
-            <a:schemeClr val="accent1"/>
-          </a:fillRef>
-          <a:effectRef idx="0">
-            <a:schemeClr val="accent1"/>
-          </a:effectRef>
-          <a:fontRef idx="minor">
-            <a:schemeClr val="tx1"/>
-          </a:fontRef>
-        </p:style>
-      </p:cxnSp>
-    </p:spTree>
-    <p:extLst>
-      <p:ext uri="{BB962C8B-B14F-4D97-AF65-F5344CB8AC3E}">
-        <p14:creationId xmlns:p14="http://schemas.microsoft.com/office/powerpoint/2010/main" val="392014652"/>
-      </p:ext>
-    </p:extLst>
-  </p:cSld>
-  <p:clrMapOvr>
-    <a:masterClrMapping/>
-  </p:clrMapOvr>
-</p:sld>
-</file>
-
 <file path=ppt/slides/slide5.xml><?xml version="1.0" encoding="utf-8"?>
-<p:sld xmlns:a="http://schemas.openxmlformats.org/drawingml/2006/main" xmlns:r="http://schemas.openxmlformats.org/officeDocument/2006/relationships" xmlns:p="http://schemas.openxmlformats.org/presentationml/2006/main">
-  <p:cSld>
-    <p:spTree>
-      <p:nvGrpSpPr>
-        <p:cNvPr id="1" name=""/>
-        <p:cNvGrpSpPr/>
-        <p:nvPr/>
-      </p:nvGrpSpPr>
-      <p:grpSpPr>
-        <a:xfrm>
-          <a:off x="0" y="0"/>
-          <a:ext cx="0" cy="0"/>
-          <a:chOff x="0" y="0"/>
-          <a:chExt cx="0" cy="0"/>
-        </a:xfrm>
-      </p:grpSpPr>
-      <p:sp>
-        <p:nvSpPr>
-          <p:cNvPr id="2" name="Tittel 1">
-            <a:extLst>
-              <a:ext uri="{FF2B5EF4-FFF2-40B4-BE49-F238E27FC236}">
-                <a16:creationId xmlns:a16="http://schemas.microsoft.com/office/drawing/2014/main" id="{D1E179CF-941C-4C95-AE9A-B261857BB9C7}"/>
-              </a:ext>
-            </a:extLst>
-          </p:cNvPr>
-          <p:cNvSpPr>
-            <a:spLocks noGrp="1"/>
-          </p:cNvSpPr>
-          <p:nvPr>
-            <p:ph type="title"/>
-          </p:nvPr>
-        </p:nvSpPr>
-        <p:spPr>
-          <a:xfrm>
-            <a:off x="677334" y="609600"/>
-            <a:ext cx="8596668" cy="45719"/>
-          </a:xfrm>
-        </p:spPr>
-        <p:txBody>
-          <a:bodyPr>
-            <a:normAutofit fontScale="90000"/>
-          </a:bodyPr>
-          <a:lstStyle/>
-          <a:p>
-            <a:endParaRPr lang="nb-NO" dirty="0"/>
-          </a:p>
-        </p:txBody>
-      </p:sp>
-      <p:pic>
-        <p:nvPicPr>
-          <p:cNvPr id="5" name="Plassholder for innhold 4">
-            <a:extLst>
-              <a:ext uri="{FF2B5EF4-FFF2-40B4-BE49-F238E27FC236}">
-                <a16:creationId xmlns:a16="http://schemas.microsoft.com/office/drawing/2014/main" id="{9B076391-AA85-4245-BB64-8EC33FA23F9B}"/>
-              </a:ext>
-            </a:extLst>
-          </p:cNvPr>
-          <p:cNvPicPr>
-            <a:picLocks noGrp="1" noChangeAspect="1"/>
-          </p:cNvPicPr>
-          <p:nvPr>
-            <p:ph idx="1"/>
-          </p:nvPr>
-        </p:nvPicPr>
-        <p:blipFill>
-          <a:blip r:embed="rId2">
-            <a:extLst>
-              <a:ext uri="{28A0092B-C50C-407E-A947-70E740481C1C}">
-                <a14:useLocalDpi xmlns:a14="http://schemas.microsoft.com/office/drawing/2010/main" val="0"/>
-              </a:ext>
-            </a:extLst>
-          </a:blip>
-          <a:stretch>
-            <a:fillRect/>
-          </a:stretch>
-        </p:blipFill>
-        <p:spPr>
-          <a:xfrm>
-            <a:off x="4900474" y="727970"/>
-            <a:ext cx="4656719" cy="5225294"/>
-          </a:xfrm>
-        </p:spPr>
-      </p:pic>
-      <p:pic>
-        <p:nvPicPr>
-          <p:cNvPr id="7" name="Bilde 6">
-            <a:extLst>
-              <a:ext uri="{FF2B5EF4-FFF2-40B4-BE49-F238E27FC236}">
-                <a16:creationId xmlns:a16="http://schemas.microsoft.com/office/drawing/2014/main" id="{FD26D182-E030-4C3B-B76D-27B13ACBFBAE}"/>
-              </a:ext>
-            </a:extLst>
-          </p:cNvPr>
-          <p:cNvPicPr>
-            <a:picLocks noChangeAspect="1"/>
-          </p:cNvPicPr>
-          <p:nvPr/>
-        </p:nvPicPr>
-        <p:blipFill>
-          <a:blip r:embed="rId3">
-            <a:extLst>
-              <a:ext uri="{28A0092B-C50C-407E-A947-70E740481C1C}">
-                <a14:useLocalDpi xmlns:a14="http://schemas.microsoft.com/office/drawing/2010/main" val="0"/>
-              </a:ext>
-            </a:extLst>
-          </a:blip>
-          <a:stretch>
-            <a:fillRect/>
-          </a:stretch>
-        </p:blipFill>
-        <p:spPr>
-          <a:xfrm>
-            <a:off x="390617" y="727969"/>
-            <a:ext cx="4315459" cy="5225294"/>
-          </a:xfrm>
-          <a:prstGeom prst="rect">
-            <a:avLst/>
-          </a:prstGeom>
-        </p:spPr>
-      </p:pic>
-    </p:spTree>
-    <p:extLst>
-      <p:ext uri="{BB962C8B-B14F-4D97-AF65-F5344CB8AC3E}">
-        <p14:creationId xmlns:p14="http://schemas.microsoft.com/office/powerpoint/2010/main" val="533790572"/>
-      </p:ext>
-    </p:extLst>
-  </p:cSld>
-  <p:clrMapOvr>
-    <a:masterClrMapping/>
-  </p:clrMapOvr>
-</p:sld>
-</file>
-
-<file path=ppt/slides/slide6.xml><?xml version="1.0" encoding="utf-8"?>
 <p:sld xmlns:a="http://schemas.openxmlformats.org/drawingml/2006/main" xmlns:r="http://schemas.openxmlformats.org/officeDocument/2006/relationships" xmlns:p="http://schemas.openxmlformats.org/presentationml/2006/main">
   <p:cSld>
     <p:spTree>
@@ -7416,7 +7637,7 @@
 </p:sld>
 </file>
 
-<file path=ppt/slides/slide7.xml><?xml version="1.0" encoding="utf-8"?>
+<file path=ppt/slides/slide6.xml><?xml version="1.0" encoding="utf-8"?>
 <p:sld xmlns:a="http://schemas.openxmlformats.org/drawingml/2006/main" xmlns:r="http://schemas.openxmlformats.org/officeDocument/2006/relationships" xmlns:p="http://schemas.openxmlformats.org/presentationml/2006/main">
   <p:cSld>
     <p:spTree>
@@ -7517,7 +7738,7 @@
 </p:sld>
 </file>
 
-<file path=ppt/slides/slide8.xml><?xml version="1.0" encoding="utf-8"?>
+<file path=ppt/slides/slide7.xml><?xml version="1.0" encoding="utf-8"?>
 <p:sld xmlns:a="http://schemas.openxmlformats.org/drawingml/2006/main" xmlns:r="http://schemas.openxmlformats.org/officeDocument/2006/relationships" xmlns:p="http://schemas.openxmlformats.org/presentationml/2006/main">
   <p:cSld>
     <p:spTree>
@@ -7748,6 +7969,260 @@
     <p:extLst>
       <p:ext uri="{BB962C8B-B14F-4D97-AF65-F5344CB8AC3E}">
         <p14:creationId xmlns:p14="http://schemas.microsoft.com/office/powerpoint/2010/main" val="4227717258"/>
+      </p:ext>
+    </p:extLst>
+  </p:cSld>
+  <p:clrMapOvr>
+    <a:masterClrMapping/>
+  </p:clrMapOvr>
+</p:sld>
+</file>
+
+<file path=ppt/slides/slide8.xml><?xml version="1.0" encoding="utf-8"?>
+<p:sld xmlns:a="http://schemas.openxmlformats.org/drawingml/2006/main" xmlns:r="http://schemas.openxmlformats.org/officeDocument/2006/relationships" xmlns:p="http://schemas.openxmlformats.org/presentationml/2006/main">
+  <p:cSld>
+    <p:spTree>
+      <p:nvGrpSpPr>
+        <p:cNvPr id="1" name=""/>
+        <p:cNvGrpSpPr/>
+        <p:nvPr/>
+      </p:nvGrpSpPr>
+      <p:grpSpPr>
+        <a:xfrm>
+          <a:off x="0" y="0"/>
+          <a:ext cx="0" cy="0"/>
+          <a:chOff x="0" y="0"/>
+          <a:chExt cx="0" cy="0"/>
+        </a:xfrm>
+      </p:grpSpPr>
+      <p:pic>
+        <p:nvPicPr>
+          <p:cNvPr id="3" name="Bilde 2">
+            <a:extLst>
+              <a:ext uri="{FF2B5EF4-FFF2-40B4-BE49-F238E27FC236}">
+                <a16:creationId xmlns:a16="http://schemas.microsoft.com/office/drawing/2014/main" id="{53A4709E-7FD2-4FA0-994C-89689C471C44}"/>
+              </a:ext>
+            </a:extLst>
+          </p:cNvPr>
+          <p:cNvPicPr>
+            <a:picLocks noChangeAspect="1"/>
+          </p:cNvPicPr>
+          <p:nvPr/>
+        </p:nvPicPr>
+        <p:blipFill>
+          <a:blip r:embed="rId2">
+            <a:extLst>
+              <a:ext uri="{28A0092B-C50C-407E-A947-70E740481C1C}">
+                <a14:useLocalDpi xmlns:a14="http://schemas.microsoft.com/office/drawing/2010/main" val="0"/>
+              </a:ext>
+            </a:extLst>
+          </a:blip>
+          <a:stretch>
+            <a:fillRect/>
+          </a:stretch>
+        </p:blipFill>
+        <p:spPr>
+          <a:xfrm>
+            <a:off x="665825" y="266699"/>
+            <a:ext cx="6658900" cy="3427375"/>
+          </a:xfrm>
+          <a:prstGeom prst="rect">
+            <a:avLst/>
+          </a:prstGeom>
+        </p:spPr>
+      </p:pic>
+      <p:sp>
+        <p:nvSpPr>
+          <p:cNvPr id="6" name="TekstSylinder 5">
+            <a:extLst>
+              <a:ext uri="{FF2B5EF4-FFF2-40B4-BE49-F238E27FC236}">
+                <a16:creationId xmlns:a16="http://schemas.microsoft.com/office/drawing/2014/main" id="{CAE73E61-9109-44FB-9E99-29D8F7674BD4}"/>
+              </a:ext>
+            </a:extLst>
+          </p:cNvPr>
+          <p:cNvSpPr txBox="1"/>
+          <p:nvPr/>
+        </p:nvSpPr>
+        <p:spPr>
+          <a:xfrm>
+            <a:off x="665825" y="4154749"/>
+            <a:ext cx="4891596" cy="1477328"/>
+          </a:xfrm>
+          <a:prstGeom prst="rect">
+            <a:avLst/>
+          </a:prstGeom>
+          <a:noFill/>
+        </p:spPr>
+        <p:txBody>
+          <a:bodyPr wrap="square" rtlCol="0">
+            <a:spAutoFit/>
+          </a:bodyPr>
+          <a:lstStyle/>
+          <a:p>
+            <a:pPr marL="285750" indent="-285750">
+              <a:buFont typeface="Arial" panose="020B0604020202020204" pitchFamily="34" charset="0"/>
+              <a:buChar char="•"/>
+            </a:pPr>
+            <a:r>
+              <a:rPr lang="nb-NO" dirty="0"/>
+              <a:t>Totalt: 34 tester</a:t>
+            </a:r>
+          </a:p>
+          <a:p>
+            <a:endParaRPr lang="nb-NO" dirty="0"/>
+          </a:p>
+          <a:p>
+            <a:pPr marL="285750" indent="-285750">
+              <a:buFont typeface="Arial" panose="020B0604020202020204" pitchFamily="34" charset="0"/>
+              <a:buChar char="•"/>
+            </a:pPr>
+            <a:r>
+              <a:rPr lang="nb-NO" dirty="0"/>
+              <a:t>Flere statistiske tester</a:t>
+            </a:r>
+          </a:p>
+          <a:p>
+            <a:endParaRPr lang="nb-NO" dirty="0"/>
+          </a:p>
+          <a:p>
+            <a:pPr marL="285750" indent="-285750">
+              <a:buFont typeface="Arial" panose="020B0604020202020204" pitchFamily="34" charset="0"/>
+              <a:buChar char="•"/>
+            </a:pPr>
+            <a:r>
+              <a:rPr lang="nb-NO" dirty="0"/>
+              <a:t>simulation.py: mye grafisk</a:t>
+            </a:r>
+          </a:p>
+        </p:txBody>
+      </p:sp>
+    </p:spTree>
+    <p:extLst>
+      <p:ext uri="{BB962C8B-B14F-4D97-AF65-F5344CB8AC3E}">
+        <p14:creationId xmlns:p14="http://schemas.microsoft.com/office/powerpoint/2010/main" val="1084711481"/>
+      </p:ext>
+    </p:extLst>
+  </p:cSld>
+  <p:clrMapOvr>
+    <a:masterClrMapping/>
+  </p:clrMapOvr>
+</p:sld>
+</file>
+
+<file path=ppt/slides/slide9.xml><?xml version="1.0" encoding="utf-8"?>
+<p:sld xmlns:a="http://schemas.openxmlformats.org/drawingml/2006/main" xmlns:r="http://schemas.openxmlformats.org/officeDocument/2006/relationships" xmlns:p="http://schemas.openxmlformats.org/presentationml/2006/main">
+  <p:cSld>
+    <p:spTree>
+      <p:nvGrpSpPr>
+        <p:cNvPr id="1" name=""/>
+        <p:cNvGrpSpPr/>
+        <p:nvPr/>
+      </p:nvGrpSpPr>
+      <p:grpSpPr>
+        <a:xfrm>
+          <a:off x="0" y="0"/>
+          <a:ext cx="0" cy="0"/>
+          <a:chOff x="0" y="0"/>
+          <a:chExt cx="0" cy="0"/>
+        </a:xfrm>
+      </p:grpSpPr>
+      <p:sp>
+        <p:nvSpPr>
+          <p:cNvPr id="2" name="Tittel 1">
+            <a:extLst>
+              <a:ext uri="{FF2B5EF4-FFF2-40B4-BE49-F238E27FC236}">
+                <a16:creationId xmlns:a16="http://schemas.microsoft.com/office/drawing/2014/main" id="{D1E179CF-941C-4C95-AE9A-B261857BB9C7}"/>
+              </a:ext>
+            </a:extLst>
+          </p:cNvPr>
+          <p:cNvSpPr>
+            <a:spLocks noGrp="1"/>
+          </p:cNvSpPr>
+          <p:nvPr>
+            <p:ph type="title"/>
+          </p:nvPr>
+        </p:nvSpPr>
+        <p:spPr>
+          <a:xfrm>
+            <a:off x="677334" y="609600"/>
+            <a:ext cx="8596668" cy="45719"/>
+          </a:xfrm>
+        </p:spPr>
+        <p:txBody>
+          <a:bodyPr>
+            <a:normAutofit fontScale="90000"/>
+          </a:bodyPr>
+          <a:lstStyle/>
+          <a:p>
+            <a:endParaRPr lang="nb-NO" dirty="0"/>
+          </a:p>
+        </p:txBody>
+      </p:sp>
+      <p:pic>
+        <p:nvPicPr>
+          <p:cNvPr id="7" name="Bilde 6">
+            <a:extLst>
+              <a:ext uri="{FF2B5EF4-FFF2-40B4-BE49-F238E27FC236}">
+                <a16:creationId xmlns:a16="http://schemas.microsoft.com/office/drawing/2014/main" id="{FD26D182-E030-4C3B-B76D-27B13ACBFBAE}"/>
+              </a:ext>
+            </a:extLst>
+          </p:cNvPr>
+          <p:cNvPicPr>
+            <a:picLocks noChangeAspect="1"/>
+          </p:cNvPicPr>
+          <p:nvPr/>
+        </p:nvPicPr>
+        <p:blipFill>
+          <a:blip r:embed="rId2">
+            <a:extLst>
+              <a:ext uri="{28A0092B-C50C-407E-A947-70E740481C1C}">
+                <a14:useLocalDpi xmlns:a14="http://schemas.microsoft.com/office/drawing/2010/main" val="0"/>
+              </a:ext>
+            </a:extLst>
+          </a:blip>
+          <a:stretch>
+            <a:fillRect/>
+          </a:stretch>
+        </p:blipFill>
+        <p:spPr>
+          <a:xfrm>
+            <a:off x="2219417" y="277452"/>
+            <a:ext cx="5184559" cy="6277628"/>
+          </a:xfrm>
+          <a:prstGeom prst="rect">
+            <a:avLst/>
+          </a:prstGeom>
+        </p:spPr>
+      </p:pic>
+      <p:sp>
+        <p:nvSpPr>
+          <p:cNvPr id="4" name="Plassholder for innhold 3">
+            <a:extLst>
+              <a:ext uri="{FF2B5EF4-FFF2-40B4-BE49-F238E27FC236}">
+                <a16:creationId xmlns:a16="http://schemas.microsoft.com/office/drawing/2014/main" id="{E36EF3E2-2CB5-44CF-AAD4-75602C7DB75C}"/>
+              </a:ext>
+            </a:extLst>
+          </p:cNvPr>
+          <p:cNvSpPr>
+            <a:spLocks noGrp="1"/>
+          </p:cNvSpPr>
+          <p:nvPr>
+            <p:ph idx="1"/>
+          </p:nvPr>
+        </p:nvSpPr>
+        <p:spPr/>
+        <p:txBody>
+          <a:bodyPr/>
+          <a:lstStyle/>
+          <a:p>
+            <a:endParaRPr lang="nb-NO" dirty="0"/>
+          </a:p>
+        </p:txBody>
+      </p:sp>
+    </p:spTree>
+    <p:extLst>
+      <p:ext uri="{BB962C8B-B14F-4D97-AF65-F5344CB8AC3E}">
+        <p14:creationId xmlns:p14="http://schemas.microsoft.com/office/powerpoint/2010/main" val="533790572"/>
       </p:ext>
     </p:extLst>
   </p:cSld>

</xml_diff>